<commit_message>
REPORTGEN-163: update library templates
</commit_message>
<xml_diff>
--- a/CastReporting.Reporting.Core/Templates/Portfolio/Portfolio component library/1- Portfolio-Powerpoint-components-library.pptx
+++ b/CastReporting.Reporting.Core/Templates/Portfolio/Portfolio component library/1- Portfolio-Powerpoint-components-library.pptx
@@ -10,7 +10,7 @@
     <p:sldMasterId id="2147483713" r:id="rId6"/>
   </p:sldMasterIdLst>
   <p:notesMasterIdLst>
-    <p:notesMasterId r:id="rId32"/>
+    <p:notesMasterId r:id="rId33"/>
   </p:notesMasterIdLst>
   <p:sldIdLst>
     <p:sldId id="262" r:id="rId7"/>
@@ -36,8 +36,9 @@
     <p:sldId id="332" r:id="rId27"/>
     <p:sldId id="303" r:id="rId28"/>
     <p:sldId id="335" r:id="rId29"/>
-    <p:sldId id="333" r:id="rId30"/>
-    <p:sldId id="318" r:id="rId31"/>
+    <p:sldId id="337" r:id="rId30"/>
+    <p:sldId id="333" r:id="rId31"/>
+    <p:sldId id="318" r:id="rId32"/>
   </p:sldIdLst>
   <p:sldSz cx="9144000" cy="6858000" type="screen4x3"/>
   <p:notesSz cx="6858000" cy="9144000"/>
@@ -2180,7 +2181,7 @@
           <a:p>
             <a:fld id="{268042A1-6D91-4513-A62D-1E3FD70C84BE}" type="datetimeFigureOut">
               <a:rPr lang="fr-FR" smtClean="0"/>
-              <a:t>09/04/2019</a:t>
+              <a:t>24/03/2020</a:t>
             </a:fld>
             <a:endParaRPr lang="fr-FR"/>
           </a:p>
@@ -2778,7 +2779,7 @@
             <a:fld id="{D8E3BBD6-5DF7-411E-B793-6A3558CCCDCA}" type="datetimeFigureOut">
               <a:rPr lang="fr-FR" smtClean="0"/>
               <a:pPr/>
-              <a:t>09/04/2019</a:t>
+              <a:t>24/03/2020</a:t>
             </a:fld>
             <a:endParaRPr lang="fr-FR" dirty="0"/>
           </a:p>
@@ -2941,7 +2942,7 @@
             <a:fld id="{D8E3BBD6-5DF7-411E-B793-6A3558CCCDCA}" type="datetimeFigureOut">
               <a:rPr lang="fr-FR" smtClean="0"/>
               <a:pPr/>
-              <a:t>09/04/2019</a:t>
+              <a:t>24/03/2020</a:t>
             </a:fld>
             <a:endParaRPr lang="fr-FR" dirty="0"/>
           </a:p>
@@ -4446,7 +4447,7 @@
             <a:fld id="{D8E3BBD6-5DF7-411E-B793-6A3558CCCDCA}" type="datetimeFigureOut">
               <a:rPr lang="fr-FR" smtClean="0"/>
               <a:pPr/>
-              <a:t>09/04/2019</a:t>
+              <a:t>24/03/2020</a:t>
             </a:fld>
             <a:endParaRPr lang="fr-FR" dirty="0"/>
           </a:p>
@@ -6806,7 +6807,7 @@
             <a:fld id="{D8E3BBD6-5DF7-411E-B793-6A3558CCCDCA}" type="datetimeFigureOut">
               <a:rPr lang="fr-FR" smtClean="0"/>
               <a:pPr/>
-              <a:t>09/04/2019</a:t>
+              <a:t>24/03/2020</a:t>
             </a:fld>
             <a:endParaRPr lang="fr-FR" dirty="0"/>
           </a:p>
@@ -9432,7 +9433,7 @@
             <a:fld id="{D8E3BBD6-5DF7-411E-B793-6A3558CCCDCA}" type="datetimeFigureOut">
               <a:rPr lang="fr-FR" smtClean="0"/>
               <a:pPr/>
-              <a:t>09/04/2019</a:t>
+              <a:t>24/03/2020</a:t>
             </a:fld>
             <a:endParaRPr lang="fr-FR" dirty="0"/>
           </a:p>
@@ -12341,7 +12342,7 @@
             <a:fld id="{D8E3BBD6-5DF7-411E-B793-6A3558CCCDCA}" type="datetimeFigureOut">
               <a:rPr lang="fr-FR" smtClean="0"/>
               <a:pPr/>
-              <a:t>09/04/2019</a:t>
+              <a:t>24/03/2020</a:t>
             </a:fld>
             <a:endParaRPr lang="fr-FR" dirty="0"/>
           </a:p>
@@ -14125,7 +14126,7 @@
             <a:fld id="{D8E3BBD6-5DF7-411E-B793-6A3558CCCDCA}" type="datetimeFigureOut">
               <a:rPr lang="fr-FR" smtClean="0"/>
               <a:pPr/>
-              <a:t>09/04/2019</a:t>
+              <a:t>24/03/2020</a:t>
             </a:fld>
             <a:endParaRPr lang="fr-FR" dirty="0"/>
           </a:p>
@@ -14205,7 +14206,7 @@
             <a:fld id="{D8E3BBD6-5DF7-411E-B793-6A3558CCCDCA}" type="datetimeFigureOut">
               <a:rPr lang="fr-FR" smtClean="0"/>
               <a:pPr/>
-              <a:t>09/04/2019</a:t>
+              <a:t>24/03/2020</a:t>
             </a:fld>
             <a:endParaRPr lang="fr-FR" dirty="0"/>
           </a:p>
@@ -14465,7 +14466,7 @@
             <a:fld id="{D8E3BBD6-5DF7-411E-B793-6A3558CCCDCA}" type="datetimeFigureOut">
               <a:rPr lang="fr-FR" smtClean="0"/>
               <a:pPr/>
-              <a:t>09/04/2019</a:t>
+              <a:t>24/03/2020</a:t>
             </a:fld>
             <a:endParaRPr lang="fr-FR" dirty="0"/>
           </a:p>
@@ -14707,7 +14708,7 @@
             <a:fld id="{D8E3BBD6-5DF7-411E-B793-6A3558CCCDCA}" type="datetimeFigureOut">
               <a:rPr lang="fr-FR" smtClean="0"/>
               <a:pPr/>
-              <a:t>09/04/2019</a:t>
+              <a:t>24/03/2020</a:t>
             </a:fld>
             <a:endParaRPr lang="fr-FR" dirty="0"/>
           </a:p>
@@ -14909,7 +14910,7 @@
             <a:fld id="{D8E3BBD6-5DF7-411E-B793-6A3558CCCDCA}" type="datetimeFigureOut">
               <a:rPr lang="fr-FR" smtClean="0"/>
               <a:pPr/>
-              <a:t>09/04/2019</a:t>
+              <a:t>24/03/2020</a:t>
             </a:fld>
             <a:endParaRPr lang="fr-FR" dirty="0"/>
           </a:p>
@@ -26636,14 +26637,14 @@
       </p:sp>
       <p:graphicFrame>
         <p:nvGraphicFramePr>
-          <p:cNvPr id="10" name="Table 9" descr="TABLE;PF_BC_RELEASE_PERFORMANCE;BF=2.90 2.90 2.90 2.90 2.90 2.90 2.90 2.90;SLA=2 5"/>
+          <p:cNvPr id="10" name="Table 9" descr="TABLE;PF_BC_RELEASE_PERFORMANCE;BF=2.90 2.90 2.90 2.90 2.90 2.90 2.90 2.90,SLA=2 5"/>
           <p:cNvGraphicFramePr>
             <a:graphicFrameLocks noGrp="1"/>
           </p:cNvGraphicFramePr>
           <p:nvPr>
             <p:extLst>
               <p:ext uri="{D42A27DB-BD31-4B8C-83A1-F6EECF244321}">
-                <p14:modId xmlns:p14="http://schemas.microsoft.com/office/powerpoint/2010/main" val="1441438410"/>
+                <p14:modId xmlns:p14="http://schemas.microsoft.com/office/powerpoint/2010/main" val="3212611895"/>
               </p:ext>
             </p:extLst>
           </p:nvPr>
@@ -28591,7 +28592,7 @@
         </p:nvSpPr>
         <p:spPr>
           <a:xfrm>
-            <a:off x="395536" y="1218238"/>
+            <a:off x="395536" y="1434262"/>
             <a:ext cx="8143200" cy="338554"/>
           </a:xfrm>
           <a:prstGeom prst="rect">
@@ -28635,7 +28636,7 @@
         <p:spPr>
           <a:xfrm>
             <a:off x="2051720" y="724634"/>
-            <a:ext cx="6630534" cy="369332"/>
+            <a:ext cx="6630534" cy="646331"/>
           </a:xfrm>
           <a:prstGeom prst="rect">
             <a:avLst/>
@@ -28661,7 +28662,7 @@
           <a:p>
             <a:r>
               <a:rPr lang="en-US" sz="1800" dirty="0"/>
-              <a:t>PF_BC_RELEASE_PERFORMANCE</a:t>
+              <a:t>PF_BC_RELEASE_PERFORMANCE &amp; PF_TABLE_RELEASE_PERFORMANCE</a:t>
             </a:r>
           </a:p>
         </p:txBody>
@@ -28746,6 +28747,1599 @@
 </file>
 
 <file path=ppt/slides/slide24.xml><?xml version="1.0" encoding="utf-8"?>
+<p:sld xmlns:a="http://schemas.openxmlformats.org/drawingml/2006/main" xmlns:r="http://schemas.openxmlformats.org/officeDocument/2006/relationships" xmlns:p="http://schemas.openxmlformats.org/presentationml/2006/main">
+  <p:cSld>
+    <p:spTree>
+      <p:nvGrpSpPr>
+        <p:cNvPr id="1" name=""/>
+        <p:cNvGrpSpPr/>
+        <p:nvPr/>
+      </p:nvGrpSpPr>
+      <p:grpSpPr>
+        <a:xfrm>
+          <a:off x="0" y="0"/>
+          <a:ext cx="0" cy="0"/>
+          <a:chOff x="0" y="0"/>
+          <a:chExt cx="0" cy="0"/>
+        </a:xfrm>
+      </p:grpSpPr>
+      <p:sp>
+        <p:nvSpPr>
+          <p:cNvPr id="24" name="Title 1"/>
+          <p:cNvSpPr>
+            <a:spLocks noGrp="1"/>
+          </p:cNvSpPr>
+          <p:nvPr>
+            <p:ph type="title"/>
+          </p:nvPr>
+        </p:nvSpPr>
+        <p:spPr/>
+        <p:txBody>
+          <a:bodyPr>
+            <a:normAutofit/>
+          </a:bodyPr>
+          <a:lstStyle/>
+          <a:p>
+            <a:r>
+              <a:rPr lang="en-US" dirty="0"/>
+              <a:t>PowerPoint Templates – Tables</a:t>
+            </a:r>
+          </a:p>
+        </p:txBody>
+      </p:sp>
+      <p:sp>
+        <p:nvSpPr>
+          <p:cNvPr id="12" name="Rounded Rectangle 11"/>
+          <p:cNvSpPr/>
+          <p:nvPr/>
+        </p:nvSpPr>
+        <p:spPr>
+          <a:xfrm>
+            <a:off x="459645" y="908720"/>
+            <a:ext cx="8267157" cy="5688632"/>
+          </a:xfrm>
+          <a:prstGeom prst="roundRect">
+            <a:avLst>
+              <a:gd name="adj" fmla="val 2663"/>
+            </a:avLst>
+          </a:prstGeom>
+          <a:solidFill>
+            <a:schemeClr val="bg1">
+              <a:lumMod val="95000"/>
+            </a:schemeClr>
+          </a:solidFill>
+          <a:ln>
+            <a:noFill/>
+          </a:ln>
+          <a:effectLst/>
+        </p:spPr>
+        <p:style>
+          <a:lnRef idx="1">
+            <a:schemeClr val="accent5"/>
+          </a:lnRef>
+          <a:fillRef idx="3">
+            <a:schemeClr val="accent5"/>
+          </a:fillRef>
+          <a:effectRef idx="2">
+            <a:schemeClr val="accent5"/>
+          </a:effectRef>
+          <a:fontRef idx="minor">
+            <a:schemeClr val="lt1"/>
+          </a:fontRef>
+        </p:style>
+        <p:txBody>
+          <a:bodyPr rtlCol="0" anchor="ctr"/>
+          <a:lstStyle/>
+          <a:p>
+            <a:pPr algn="ctr"/>
+            <a:endParaRPr lang="en-US" dirty="0">
+              <a:solidFill>
+                <a:schemeClr val="lt1"/>
+              </a:solidFill>
+            </a:endParaRPr>
+          </a:p>
+        </p:txBody>
+      </p:sp>
+      <p:sp>
+        <p:nvSpPr>
+          <p:cNvPr id="13" name="TextBox 12"/>
+          <p:cNvSpPr txBox="1"/>
+          <p:nvPr/>
+        </p:nvSpPr>
+        <p:spPr>
+          <a:xfrm>
+            <a:off x="395536" y="908720"/>
+            <a:ext cx="8143200" cy="400110"/>
+          </a:xfrm>
+          <a:prstGeom prst="rect">
+            <a:avLst/>
+          </a:prstGeom>
+          <a:noFill/>
+        </p:spPr>
+        <p:txBody>
+          <a:bodyPr wrap="square" lIns="180000" rIns="180000" rtlCol="0">
+            <a:spAutoFit/>
+          </a:bodyPr>
+          <a:lstStyle>
+            <a:defPPr>
+              <a:defRPr lang="fr-FR"/>
+            </a:defPPr>
+            <a:lvl1pPr>
+              <a:defRPr sz="2000" b="1">
+                <a:solidFill>
+                  <a:schemeClr val="tx1">
+                    <a:lumMod val="75000"/>
+                    <a:lumOff val="25000"/>
+                  </a:schemeClr>
+                </a:solidFill>
+              </a:defRPr>
+            </a:lvl1pPr>
+          </a:lstStyle>
+          <a:p>
+            <a:r>
+              <a:rPr lang="en-US" dirty="0"/>
+              <a:t>Generic SLA View</a:t>
+            </a:r>
+          </a:p>
+        </p:txBody>
+      </p:sp>
+      <p:sp>
+        <p:nvSpPr>
+          <p:cNvPr id="14" name="TextBox 13"/>
+          <p:cNvSpPr txBox="1"/>
+          <p:nvPr/>
+        </p:nvSpPr>
+        <p:spPr>
+          <a:xfrm>
+            <a:off x="1979712" y="1268760"/>
+            <a:ext cx="6630534" cy="369332"/>
+          </a:xfrm>
+          <a:prstGeom prst="rect">
+            <a:avLst/>
+          </a:prstGeom>
+          <a:noFill/>
+        </p:spPr>
+        <p:txBody>
+          <a:bodyPr wrap="square" rtlCol="0">
+            <a:spAutoFit/>
+          </a:bodyPr>
+          <a:lstStyle>
+            <a:defPPr>
+              <a:defRPr lang="fr-FR"/>
+            </a:defPPr>
+            <a:lvl1pPr>
+              <a:defRPr sz="2000" b="1">
+                <a:solidFill>
+                  <a:srgbClr val="5E5E5E"/>
+                </a:solidFill>
+              </a:defRPr>
+            </a:lvl1pPr>
+          </a:lstStyle>
+          <a:p>
+            <a:r>
+              <a:rPr lang="en-US" sz="1800" dirty="0"/>
+              <a:t>PF_TABLE_RELEASE_PERFORMANCE</a:t>
+            </a:r>
+          </a:p>
+        </p:txBody>
+      </p:sp>
+      <p:sp>
+        <p:nvSpPr>
+          <p:cNvPr id="15" name="TextBox 14"/>
+          <p:cNvSpPr txBox="1"/>
+          <p:nvPr/>
+        </p:nvSpPr>
+        <p:spPr>
+          <a:xfrm>
+            <a:off x="395536" y="1268760"/>
+            <a:ext cx="1709122" cy="400110"/>
+          </a:xfrm>
+          <a:prstGeom prst="rect">
+            <a:avLst/>
+          </a:prstGeom>
+          <a:noFill/>
+        </p:spPr>
+        <p:txBody>
+          <a:bodyPr wrap="none" rtlCol="0">
+            <a:spAutoFit/>
+          </a:bodyPr>
+          <a:lstStyle>
+            <a:defPPr>
+              <a:defRPr lang="fr-FR"/>
+            </a:defPPr>
+            <a:lvl1pPr algn="r">
+              <a:defRPr sz="2000">
+                <a:solidFill>
+                  <a:schemeClr val="bg1">
+                    <a:lumMod val="50000"/>
+                  </a:schemeClr>
+                </a:solidFill>
+              </a:defRPr>
+            </a:lvl1pPr>
+          </a:lstStyle>
+          <a:p>
+            <a:r>
+              <a:rPr lang="en-US" dirty="0"/>
+              <a:t>Block Name :</a:t>
+            </a:r>
+          </a:p>
+        </p:txBody>
+      </p:sp>
+      <p:sp>
+        <p:nvSpPr>
+          <p:cNvPr id="16" name="TextBox 15"/>
+          <p:cNvSpPr txBox="1"/>
+          <p:nvPr/>
+        </p:nvSpPr>
+        <p:spPr>
+          <a:xfrm>
+            <a:off x="1991587" y="1671191"/>
+            <a:ext cx="6630534" cy="1015663"/>
+          </a:xfrm>
+          <a:prstGeom prst="rect">
+            <a:avLst/>
+          </a:prstGeom>
+          <a:noFill/>
+        </p:spPr>
+        <p:txBody>
+          <a:bodyPr wrap="square" rtlCol="0">
+            <a:spAutoFit/>
+          </a:bodyPr>
+          <a:lstStyle>
+            <a:defPPr>
+              <a:defRPr lang="fr-FR"/>
+            </a:defPPr>
+            <a:lvl1pPr>
+              <a:defRPr sz="1600" i="1">
+                <a:solidFill>
+                  <a:schemeClr val="bg1">
+                    <a:lumMod val="50000"/>
+                  </a:schemeClr>
+                </a:solidFill>
+              </a:defRPr>
+            </a:lvl1pPr>
+          </a:lstStyle>
+          <a:p>
+            <a:r>
+              <a:rPr lang="en-US" sz="1200" dirty="0"/>
+              <a:t>ID=ID1|ID2|ID3… where </a:t>
+            </a:r>
+            <a:r>
+              <a:rPr lang="en-US" sz="1200" dirty="0" err="1"/>
+              <a:t>Idx</a:t>
+            </a:r>
+            <a:r>
+              <a:rPr lang="en-US" sz="1200" dirty="0"/>
+              <a:t> is the metric id of the quality indicator (BC, TC or QR) to assess</a:t>
+            </a:r>
+          </a:p>
+          <a:p>
+            <a:r>
+              <a:rPr lang="en-US" sz="1200" dirty="0"/>
+              <a:t>TARGETS=T1|T2|T3… where Tx is a target to fix regarding each line, if only one target, it will be used for all metrics</a:t>
+            </a:r>
+          </a:p>
+          <a:p>
+            <a:r>
+              <a:rPr lang="en-US" sz="1200" dirty="0"/>
+              <a:t>SLA=X|Y where X is corresponding to the 2% and Y is corresponding to the 5% in the formula below </a:t>
+            </a:r>
+          </a:p>
+        </p:txBody>
+      </p:sp>
+      <p:sp>
+        <p:nvSpPr>
+          <p:cNvPr id="17" name="TextBox 16"/>
+          <p:cNvSpPr txBox="1"/>
+          <p:nvPr/>
+        </p:nvSpPr>
+        <p:spPr>
+          <a:xfrm>
+            <a:off x="895673" y="1588730"/>
+            <a:ext cx="1208985" cy="400110"/>
+          </a:xfrm>
+          <a:prstGeom prst="rect">
+            <a:avLst/>
+          </a:prstGeom>
+          <a:noFill/>
+        </p:spPr>
+        <p:txBody>
+          <a:bodyPr wrap="none" rtlCol="0">
+            <a:spAutoFit/>
+          </a:bodyPr>
+          <a:lstStyle>
+            <a:defPPr>
+              <a:defRPr lang="fr-FR"/>
+            </a:defPPr>
+            <a:lvl1pPr algn="r">
+              <a:defRPr sz="2000">
+                <a:solidFill>
+                  <a:schemeClr val="bg1">
+                    <a:lumMod val="50000"/>
+                  </a:schemeClr>
+                </a:solidFill>
+              </a:defRPr>
+            </a:lvl1pPr>
+          </a:lstStyle>
+          <a:p>
+            <a:r>
+              <a:rPr lang="en-US" dirty="0"/>
+              <a:t>Options :</a:t>
+            </a:r>
+          </a:p>
+        </p:txBody>
+      </p:sp>
+      <p:graphicFrame>
+        <p:nvGraphicFramePr>
+          <p:cNvPr id="10" name="Table 9" descr="TABLE;PF_TABLE_RELEASE_PERFORMANCE;ID=60017|66068|4554|7780,TARGETS=3.00,SLA=2|5"/>
+          <p:cNvGraphicFramePr>
+            <a:graphicFrameLocks noGrp="1"/>
+          </p:cNvGraphicFramePr>
+          <p:nvPr>
+            <p:extLst>
+              <p:ext uri="{D42A27DB-BD31-4B8C-83A1-F6EECF244321}">
+                <p14:modId xmlns:p14="http://schemas.microsoft.com/office/powerpoint/2010/main" val="4280737692"/>
+              </p:ext>
+            </p:extLst>
+          </p:nvPr>
+        </p:nvGraphicFramePr>
+        <p:xfrm>
+          <a:off x="755576" y="4550803"/>
+          <a:ext cx="7783158" cy="1783352"/>
+        </p:xfrm>
+        <a:graphic>
+          <a:graphicData uri="http://schemas.openxmlformats.org/drawingml/2006/table">
+            <a:tbl>
+              <a:tblPr firstCol="1" bandRow="1">
+                <a:tableStyleId>{6E25E649-3F16-4E02-A733-19D2CDBF48F0}</a:tableStyleId>
+              </a:tblPr>
+              <a:tblGrid>
+                <a:gridCol w="2993522">
+                  <a:extLst>
+                    <a:ext uri="{9D8B030D-6E8A-4147-A177-3AD203B41FA5}">
+                      <a16:colId xmlns:a16="http://schemas.microsoft.com/office/drawing/2014/main" val="20000"/>
+                    </a:ext>
+                  </a:extLst>
+                </a:gridCol>
+                <a:gridCol w="1372640">
+                  <a:extLst>
+                    <a:ext uri="{9D8B030D-6E8A-4147-A177-3AD203B41FA5}">
+                      <a16:colId xmlns:a16="http://schemas.microsoft.com/office/drawing/2014/main" val="20001"/>
+                    </a:ext>
+                  </a:extLst>
+                </a:gridCol>
+                <a:gridCol w="1138998">
+                  <a:extLst>
+                    <a:ext uri="{9D8B030D-6E8A-4147-A177-3AD203B41FA5}">
+                      <a16:colId xmlns:a16="http://schemas.microsoft.com/office/drawing/2014/main" val="20002"/>
+                    </a:ext>
+                  </a:extLst>
+                </a:gridCol>
+                <a:gridCol w="949165">
+                  <a:extLst>
+                    <a:ext uri="{9D8B030D-6E8A-4147-A177-3AD203B41FA5}">
+                      <a16:colId xmlns:a16="http://schemas.microsoft.com/office/drawing/2014/main" val="20003"/>
+                    </a:ext>
+                  </a:extLst>
+                </a:gridCol>
+                <a:gridCol w="1328833">
+                  <a:extLst>
+                    <a:ext uri="{9D8B030D-6E8A-4147-A177-3AD203B41FA5}">
+                      <a16:colId xmlns:a16="http://schemas.microsoft.com/office/drawing/2014/main" val="20004"/>
+                    </a:ext>
+                  </a:extLst>
+                </a:gridCol>
+              </a:tblGrid>
+              <a:tr h="483514">
+                <a:tc>
+                  <a:txBody>
+                    <a:bodyPr/>
+                    <a:lstStyle/>
+                    <a:p>
+                      <a:pPr>
+                        <a:lnSpc>
+                          <a:spcPct val="115000"/>
+                        </a:lnSpc>
+                        <a:spcAft>
+                          <a:spcPts val="0"/>
+                        </a:spcAft>
+                      </a:pPr>
+                      <a:r>
+                        <a:rPr lang="en-US" sz="1100" dirty="0">
+                          <a:effectLst/>
+                        </a:rPr>
+                        <a:t>Application Quality Measure</a:t>
+                      </a:r>
+                      <a:endParaRPr lang="en-IN" sz="1100" dirty="0">
+                        <a:solidFill>
+                          <a:srgbClr val="365F91"/>
+                        </a:solidFill>
+                        <a:effectLst/>
+                        <a:latin typeface="Calibri"/>
+                        <a:ea typeface="Calibri"/>
+                        <a:cs typeface="Times New Roman"/>
+                      </a:endParaRPr>
+                    </a:p>
+                  </a:txBody>
+                  <a:tcPr marL="68580" marR="68580" marT="0" marB="0" anchor="ctr"/>
+                </a:tc>
+                <a:tc>
+                  <a:txBody>
+                    <a:bodyPr/>
+                    <a:lstStyle/>
+                    <a:p>
+                      <a:pPr algn="ctr">
+                        <a:lnSpc>
+                          <a:spcPct val="115000"/>
+                        </a:lnSpc>
+                        <a:spcAft>
+                          <a:spcPts val="0"/>
+                        </a:spcAft>
+                      </a:pPr>
+                      <a:r>
+                        <a:rPr lang="en-US" sz="1100" kern="1200" dirty="0">
+                          <a:solidFill>
+                            <a:schemeClr val="dk1"/>
+                          </a:solidFill>
+                          <a:effectLst/>
+                          <a:latin typeface="+mn-lt"/>
+                          <a:ea typeface="+mn-ea"/>
+                          <a:cs typeface="+mn-cs"/>
+                        </a:rPr>
+                        <a:t>Previous quarter</a:t>
+                      </a:r>
+                      <a:endParaRPr lang="en-IN" sz="1100" kern="1200" dirty="0">
+                        <a:solidFill>
+                          <a:schemeClr val="dk1"/>
+                        </a:solidFill>
+                        <a:effectLst/>
+                        <a:latin typeface="+mn-lt"/>
+                        <a:ea typeface="+mn-ea"/>
+                        <a:cs typeface="+mn-cs"/>
+                      </a:endParaRPr>
+                    </a:p>
+                  </a:txBody>
+                  <a:tcPr marL="68580" marR="68580" marT="0" marB="0" anchor="ctr"/>
+                </a:tc>
+                <a:tc>
+                  <a:txBody>
+                    <a:bodyPr/>
+                    <a:lstStyle/>
+                    <a:p>
+                      <a:pPr algn="ctr">
+                        <a:lnSpc>
+                          <a:spcPct val="115000"/>
+                        </a:lnSpc>
+                        <a:spcAft>
+                          <a:spcPts val="0"/>
+                        </a:spcAft>
+                      </a:pPr>
+                      <a:r>
+                        <a:rPr lang="en-US" sz="1100" kern="1200" dirty="0">
+                          <a:effectLst/>
+                        </a:rPr>
+                        <a:t>Target</a:t>
+                      </a:r>
+                      <a:r>
+                        <a:rPr lang="en-US" sz="1100" kern="1200" baseline="0" dirty="0">
+                          <a:effectLst/>
+                        </a:rPr>
+                        <a:t> s</a:t>
+                      </a:r>
+                      <a:r>
+                        <a:rPr lang="en-US" sz="1100" kern="1200" dirty="0">
+                          <a:effectLst/>
+                        </a:rPr>
+                        <a:t>core</a:t>
+                      </a:r>
+                      <a:endParaRPr lang="en-IN" sz="1100" kern="1200" dirty="0">
+                        <a:solidFill>
+                          <a:schemeClr val="dk1"/>
+                        </a:solidFill>
+                        <a:effectLst/>
+                        <a:latin typeface="+mn-lt"/>
+                        <a:ea typeface="+mn-ea"/>
+                        <a:cs typeface="+mn-cs"/>
+                      </a:endParaRPr>
+                    </a:p>
+                  </a:txBody>
+                  <a:tcPr marL="68580" marR="68580" marT="0" marB="0" anchor="ctr"/>
+                </a:tc>
+                <a:tc>
+                  <a:txBody>
+                    <a:bodyPr/>
+                    <a:lstStyle/>
+                    <a:p>
+                      <a:pPr algn="ctr">
+                        <a:lnSpc>
+                          <a:spcPct val="115000"/>
+                        </a:lnSpc>
+                        <a:spcAft>
+                          <a:spcPts val="0"/>
+                        </a:spcAft>
+                      </a:pPr>
+                      <a:r>
+                        <a:rPr lang="en-US" sz="1100" dirty="0">
+                          <a:effectLst/>
+                        </a:rPr>
+                        <a:t>Actual score</a:t>
+                      </a:r>
+                    </a:p>
+                  </a:txBody>
+                  <a:tcPr marL="68580" marR="68580" marT="0" marB="0" anchor="ctr"/>
+                </a:tc>
+                <a:tc>
+                  <a:txBody>
+                    <a:bodyPr/>
+                    <a:lstStyle/>
+                    <a:p>
+                      <a:pPr algn="ctr">
+                        <a:lnSpc>
+                          <a:spcPct val="115000"/>
+                        </a:lnSpc>
+                        <a:spcAft>
+                          <a:spcPts val="0"/>
+                        </a:spcAft>
+                      </a:pPr>
+                      <a:r>
+                        <a:rPr lang="en-US" sz="1100" dirty="0">
+                          <a:effectLst/>
+                        </a:rPr>
+                        <a:t>SLA Assessment</a:t>
+                      </a:r>
+                    </a:p>
+                  </a:txBody>
+                  <a:tcPr marL="68580" marR="68580" marT="0" marB="0" anchor="ctr"/>
+                </a:tc>
+                <a:extLst>
+                  <a:ext uri="{0D108BD9-81ED-4DB2-BD59-A6C34878D82A}">
+                    <a16:rowId xmlns:a16="http://schemas.microsoft.com/office/drawing/2014/main" val="10000"/>
+                  </a:ext>
+                </a:extLst>
+              </a:tr>
+              <a:tr h="276729">
+                <a:tc>
+                  <a:txBody>
+                    <a:bodyPr/>
+                    <a:lstStyle/>
+                    <a:p>
+                      <a:pPr marL="0" marR="0" lvl="0" indent="0" algn="l" defTabSz="914400" rtl="0" eaLnBrk="1" fontAlgn="auto" latinLnBrk="0" hangingPunct="1">
+                        <a:lnSpc>
+                          <a:spcPct val="115000"/>
+                        </a:lnSpc>
+                        <a:spcBef>
+                          <a:spcPts val="0"/>
+                        </a:spcBef>
+                        <a:spcAft>
+                          <a:spcPts val="0"/>
+                        </a:spcAft>
+                        <a:buClrTx/>
+                        <a:buSzTx/>
+                        <a:buFontTx/>
+                        <a:buNone/>
+                        <a:tabLst/>
+                        <a:defRPr/>
+                      </a:pPr>
+                      <a:r>
+                        <a:rPr lang="en-US" sz="1100" dirty="0">
+                          <a:effectLst/>
+                        </a:rPr>
+                        <a:t>Total Quality Index</a:t>
+                      </a:r>
+                      <a:endParaRPr lang="en-IN" sz="1100" dirty="0">
+                        <a:solidFill>
+                          <a:srgbClr val="365F91"/>
+                        </a:solidFill>
+                        <a:effectLst/>
+                        <a:latin typeface="Calibri"/>
+                        <a:ea typeface="Calibri"/>
+                        <a:cs typeface="Times New Roman"/>
+                      </a:endParaRPr>
+                    </a:p>
+                  </a:txBody>
+                  <a:tcPr marL="68580" marR="68580" marT="0" marB="0" anchor="ctr"/>
+                </a:tc>
+                <a:tc>
+                  <a:txBody>
+                    <a:bodyPr/>
+                    <a:lstStyle/>
+                    <a:p>
+                      <a:pPr algn="ctr">
+                        <a:lnSpc>
+                          <a:spcPct val="115000"/>
+                        </a:lnSpc>
+                        <a:spcAft>
+                          <a:spcPts val="0"/>
+                        </a:spcAft>
+                      </a:pPr>
+                      <a:r>
+                        <a:rPr lang="fr-FR" sz="1100" kern="1200" dirty="0"/>
+                        <a:t>0.00</a:t>
+                      </a:r>
+                      <a:endParaRPr lang="en-IN" sz="1100" dirty="0">
+                        <a:solidFill>
+                          <a:srgbClr val="365F91"/>
+                        </a:solidFill>
+                        <a:effectLst/>
+                        <a:latin typeface="Calibri"/>
+                        <a:ea typeface="Calibri"/>
+                        <a:cs typeface="Times New Roman"/>
+                      </a:endParaRPr>
+                    </a:p>
+                  </a:txBody>
+                  <a:tcPr marL="68580" marR="68580" marT="0" marB="0" anchor="ctr"/>
+                </a:tc>
+                <a:tc>
+                  <a:txBody>
+                    <a:bodyPr/>
+                    <a:lstStyle/>
+                    <a:p>
+                      <a:pPr marL="0" marR="0" indent="0" algn="ctr" defTabSz="914400" rtl="0" eaLnBrk="1" fontAlgn="auto" latinLnBrk="0" hangingPunct="1">
+                        <a:lnSpc>
+                          <a:spcPct val="115000"/>
+                        </a:lnSpc>
+                        <a:spcBef>
+                          <a:spcPts val="0"/>
+                        </a:spcBef>
+                        <a:spcAft>
+                          <a:spcPts val="0"/>
+                        </a:spcAft>
+                        <a:buClrTx/>
+                        <a:buSzTx/>
+                        <a:buFontTx/>
+                        <a:buNone/>
+                        <a:tabLst/>
+                        <a:defRPr/>
+                      </a:pPr>
+                      <a:r>
+                        <a:rPr lang="fr-FR" sz="1100" kern="1200" dirty="0"/>
+                        <a:t>0.00</a:t>
+                      </a:r>
+                      <a:endParaRPr lang="fr-FR" sz="1100" kern="1200" dirty="0">
+                        <a:solidFill>
+                          <a:schemeClr val="dk1"/>
+                        </a:solidFill>
+                        <a:latin typeface="+mn-lt"/>
+                        <a:ea typeface="+mn-ea"/>
+                        <a:cs typeface="+mn-cs"/>
+                      </a:endParaRPr>
+                    </a:p>
+                  </a:txBody>
+                  <a:tcPr marL="68580" marR="68580" marT="0" marB="0" anchor="ctr"/>
+                </a:tc>
+                <a:tc>
+                  <a:txBody>
+                    <a:bodyPr/>
+                    <a:lstStyle/>
+                    <a:p>
+                      <a:pPr algn="ctr">
+                        <a:lnSpc>
+                          <a:spcPct val="115000"/>
+                        </a:lnSpc>
+                        <a:spcAft>
+                          <a:spcPts val="0"/>
+                        </a:spcAft>
+                      </a:pPr>
+                      <a:r>
+                        <a:rPr lang="fr-FR" sz="1100" kern="1200" dirty="0"/>
+                        <a:t>0.00</a:t>
+                      </a:r>
+                      <a:endParaRPr lang="en-IN" sz="1100" dirty="0">
+                        <a:solidFill>
+                          <a:srgbClr val="365F91"/>
+                        </a:solidFill>
+                        <a:effectLst/>
+                        <a:latin typeface="Calibri"/>
+                        <a:ea typeface="Calibri"/>
+                        <a:cs typeface="Times New Roman"/>
+                      </a:endParaRPr>
+                    </a:p>
+                  </a:txBody>
+                  <a:tcPr marL="68580" marR="68580" marT="0" marB="0" anchor="ctr"/>
+                </a:tc>
+                <a:tc>
+                  <a:txBody>
+                    <a:bodyPr/>
+                    <a:lstStyle/>
+                    <a:p>
+                      <a:pPr algn="ctr">
+                        <a:lnSpc>
+                          <a:spcPct val="115000"/>
+                        </a:lnSpc>
+                        <a:spcAft>
+                          <a:spcPts val="0"/>
+                        </a:spcAft>
+                      </a:pPr>
+                      <a:r>
+                        <a:rPr lang="en-US" sz="1100" dirty="0">
+                          <a:effectLst/>
+                        </a:rPr>
+                        <a:t>Good</a:t>
+                      </a:r>
+                      <a:endParaRPr lang="en-IN" sz="1100" dirty="0">
+                        <a:solidFill>
+                          <a:schemeClr val="tx1"/>
+                        </a:solidFill>
+                        <a:effectLst/>
+                        <a:latin typeface="Calibri"/>
+                        <a:ea typeface="Calibri"/>
+                        <a:cs typeface="Times New Roman"/>
+                      </a:endParaRPr>
+                    </a:p>
+                  </a:txBody>
+                  <a:tcPr marL="68580" marR="68580" marT="0" marB="0" anchor="ctr"/>
+                </a:tc>
+                <a:extLst>
+                  <a:ext uri="{0D108BD9-81ED-4DB2-BD59-A6C34878D82A}">
+                    <a16:rowId xmlns:a16="http://schemas.microsoft.com/office/drawing/2014/main" val="10001"/>
+                  </a:ext>
+                </a:extLst>
+              </a:tr>
+              <a:tr h="276729">
+                <a:tc>
+                  <a:txBody>
+                    <a:bodyPr/>
+                    <a:lstStyle/>
+                    <a:p>
+                      <a:pPr marL="0" marR="0" lvl="0" indent="0" algn="l" defTabSz="914400" rtl="0" eaLnBrk="1" fontAlgn="auto" latinLnBrk="0" hangingPunct="1">
+                        <a:lnSpc>
+                          <a:spcPct val="115000"/>
+                        </a:lnSpc>
+                        <a:spcBef>
+                          <a:spcPts val="0"/>
+                        </a:spcBef>
+                        <a:spcAft>
+                          <a:spcPts val="0"/>
+                        </a:spcAft>
+                        <a:buClrTx/>
+                        <a:buSzTx/>
+                        <a:buFontTx/>
+                        <a:buNone/>
+                        <a:tabLst/>
+                        <a:defRPr/>
+                      </a:pPr>
+                      <a:r>
+                        <a:rPr lang="en-US" sz="1100" dirty="0">
+                          <a:effectLst/>
+                        </a:rPr>
+                        <a:t>Efficiency - Expensive Calls in Loops</a:t>
+                      </a:r>
+                      <a:endParaRPr lang="en-IN" sz="1100" dirty="0">
+                        <a:solidFill>
+                          <a:srgbClr val="365F91"/>
+                        </a:solidFill>
+                        <a:effectLst/>
+                        <a:latin typeface="Calibri"/>
+                        <a:ea typeface="Calibri"/>
+                        <a:cs typeface="Times New Roman"/>
+                      </a:endParaRPr>
+                    </a:p>
+                  </a:txBody>
+                  <a:tcPr marL="68580" marR="68580" marT="0" marB="0" anchor="ctr"/>
+                </a:tc>
+                <a:tc>
+                  <a:txBody>
+                    <a:bodyPr/>
+                    <a:lstStyle/>
+                    <a:p>
+                      <a:pPr algn="ctr">
+                        <a:lnSpc>
+                          <a:spcPct val="115000"/>
+                        </a:lnSpc>
+                        <a:spcAft>
+                          <a:spcPts val="0"/>
+                        </a:spcAft>
+                      </a:pPr>
+                      <a:r>
+                        <a:rPr lang="fr-FR" sz="1100" kern="1200" dirty="0"/>
+                        <a:t>0.00</a:t>
+                      </a:r>
+                      <a:endParaRPr lang="en-IN" sz="1100" dirty="0">
+                        <a:solidFill>
+                          <a:srgbClr val="365F91"/>
+                        </a:solidFill>
+                        <a:effectLst/>
+                        <a:latin typeface="Calibri"/>
+                        <a:ea typeface="Calibri"/>
+                        <a:cs typeface="Times New Roman"/>
+                      </a:endParaRPr>
+                    </a:p>
+                  </a:txBody>
+                  <a:tcPr marL="68580" marR="68580" marT="0" marB="0" anchor="ctr"/>
+                </a:tc>
+                <a:tc>
+                  <a:txBody>
+                    <a:bodyPr/>
+                    <a:lstStyle/>
+                    <a:p>
+                      <a:pPr marL="0" marR="0" indent="0" algn="ctr" defTabSz="914400" rtl="0" eaLnBrk="1" fontAlgn="auto" latinLnBrk="0" hangingPunct="1">
+                        <a:lnSpc>
+                          <a:spcPct val="115000"/>
+                        </a:lnSpc>
+                        <a:spcBef>
+                          <a:spcPts val="0"/>
+                        </a:spcBef>
+                        <a:spcAft>
+                          <a:spcPts val="0"/>
+                        </a:spcAft>
+                        <a:buClrTx/>
+                        <a:buSzTx/>
+                        <a:buFontTx/>
+                        <a:buNone/>
+                        <a:tabLst/>
+                        <a:defRPr/>
+                      </a:pPr>
+                      <a:r>
+                        <a:rPr lang="fr-FR" sz="1100" kern="1200" dirty="0"/>
+                        <a:t>0.00</a:t>
+                      </a:r>
+                      <a:endParaRPr lang="fr-FR" sz="1100" kern="1200" dirty="0">
+                        <a:solidFill>
+                          <a:schemeClr val="dk1"/>
+                        </a:solidFill>
+                        <a:latin typeface="+mn-lt"/>
+                        <a:ea typeface="+mn-ea"/>
+                        <a:cs typeface="+mn-cs"/>
+                      </a:endParaRPr>
+                    </a:p>
+                  </a:txBody>
+                  <a:tcPr marL="68580" marR="68580" marT="0" marB="0" anchor="ctr"/>
+                </a:tc>
+                <a:tc>
+                  <a:txBody>
+                    <a:bodyPr/>
+                    <a:lstStyle/>
+                    <a:p>
+                      <a:pPr algn="ctr">
+                        <a:lnSpc>
+                          <a:spcPct val="115000"/>
+                        </a:lnSpc>
+                        <a:spcAft>
+                          <a:spcPts val="0"/>
+                        </a:spcAft>
+                      </a:pPr>
+                      <a:r>
+                        <a:rPr lang="fr-FR" sz="1100" kern="1200" dirty="0"/>
+                        <a:t>0.00</a:t>
+                      </a:r>
+                      <a:endParaRPr lang="en-IN" sz="1100" dirty="0">
+                        <a:solidFill>
+                          <a:srgbClr val="365F91"/>
+                        </a:solidFill>
+                        <a:effectLst/>
+                        <a:latin typeface="Calibri"/>
+                        <a:ea typeface="Calibri"/>
+                        <a:cs typeface="Times New Roman"/>
+                      </a:endParaRPr>
+                    </a:p>
+                  </a:txBody>
+                  <a:tcPr marL="68580" marR="68580" marT="0" marB="0" anchor="ctr"/>
+                </a:tc>
+                <a:tc>
+                  <a:txBody>
+                    <a:bodyPr/>
+                    <a:lstStyle/>
+                    <a:p>
+                      <a:pPr marL="0" marR="0" indent="0" algn="ctr" defTabSz="914400" rtl="0" eaLnBrk="1" fontAlgn="auto" latinLnBrk="0" hangingPunct="1">
+                        <a:lnSpc>
+                          <a:spcPct val="115000"/>
+                        </a:lnSpc>
+                        <a:spcBef>
+                          <a:spcPts val="0"/>
+                        </a:spcBef>
+                        <a:spcAft>
+                          <a:spcPts val="0"/>
+                        </a:spcAft>
+                        <a:buClrTx/>
+                        <a:buSzTx/>
+                        <a:buFontTx/>
+                        <a:buNone/>
+                        <a:tabLst/>
+                        <a:defRPr/>
+                      </a:pPr>
+                      <a:r>
+                        <a:rPr lang="en-US" sz="1100" dirty="0">
+                          <a:effectLst/>
+                        </a:rPr>
+                        <a:t>Good</a:t>
+                      </a:r>
+                      <a:endParaRPr lang="en-IN" sz="1100" dirty="0">
+                        <a:solidFill>
+                          <a:schemeClr val="tx1"/>
+                        </a:solidFill>
+                        <a:effectLst/>
+                        <a:latin typeface="+mn-lt"/>
+                        <a:ea typeface="Calibri"/>
+                        <a:cs typeface="Times New Roman"/>
+                      </a:endParaRPr>
+                    </a:p>
+                  </a:txBody>
+                  <a:tcPr marL="68580" marR="68580" marT="0" marB="0" anchor="ctr"/>
+                </a:tc>
+                <a:extLst>
+                  <a:ext uri="{0D108BD9-81ED-4DB2-BD59-A6C34878D82A}">
+                    <a16:rowId xmlns:a16="http://schemas.microsoft.com/office/drawing/2014/main" val="10002"/>
+                  </a:ext>
+                </a:extLst>
+              </a:tr>
+              <a:tr h="276729">
+                <a:tc>
+                  <a:txBody>
+                    <a:bodyPr/>
+                    <a:lstStyle/>
+                    <a:p>
+                      <a:pPr marL="0" marR="0" lvl="0" indent="0" algn="l" defTabSz="914400" rtl="0" eaLnBrk="1" fontAlgn="auto" latinLnBrk="0" hangingPunct="1">
+                        <a:lnSpc>
+                          <a:spcPct val="115000"/>
+                        </a:lnSpc>
+                        <a:spcBef>
+                          <a:spcPts val="0"/>
+                        </a:spcBef>
+                        <a:spcAft>
+                          <a:spcPts val="0"/>
+                        </a:spcAft>
+                        <a:buClrTx/>
+                        <a:buSzTx/>
+                        <a:buFontTx/>
+                        <a:buNone/>
+                        <a:tabLst/>
+                        <a:defRPr/>
+                      </a:pPr>
+                      <a:r>
+                        <a:rPr lang="en-US" sz="1100" dirty="0">
+                          <a:effectLst/>
+                        </a:rPr>
+                        <a:t>Avoid large Classes - too many Methods (JEE) (4554)</a:t>
+                      </a:r>
+                      <a:endParaRPr lang="en-IN" sz="1100" dirty="0">
+                        <a:solidFill>
+                          <a:srgbClr val="365F91"/>
+                        </a:solidFill>
+                        <a:effectLst/>
+                        <a:latin typeface="Calibri"/>
+                        <a:ea typeface="Calibri"/>
+                        <a:cs typeface="Times New Roman"/>
+                      </a:endParaRPr>
+                    </a:p>
+                  </a:txBody>
+                  <a:tcPr marL="68580" marR="68580" marT="0" marB="0" anchor="ctr"/>
+                </a:tc>
+                <a:tc>
+                  <a:txBody>
+                    <a:bodyPr/>
+                    <a:lstStyle/>
+                    <a:p>
+                      <a:pPr algn="ctr">
+                        <a:lnSpc>
+                          <a:spcPct val="115000"/>
+                        </a:lnSpc>
+                        <a:spcAft>
+                          <a:spcPts val="0"/>
+                        </a:spcAft>
+                      </a:pPr>
+                      <a:r>
+                        <a:rPr lang="fr-FR" sz="1100" kern="1200" dirty="0"/>
+                        <a:t>0.00</a:t>
+                      </a:r>
+                      <a:endParaRPr lang="en-IN" sz="1100" dirty="0">
+                        <a:solidFill>
+                          <a:srgbClr val="365F91"/>
+                        </a:solidFill>
+                        <a:effectLst/>
+                        <a:latin typeface="Calibri"/>
+                        <a:ea typeface="Calibri"/>
+                        <a:cs typeface="Times New Roman"/>
+                      </a:endParaRPr>
+                    </a:p>
+                  </a:txBody>
+                  <a:tcPr marL="68580" marR="68580" marT="0" marB="0" anchor="ctr"/>
+                </a:tc>
+                <a:tc>
+                  <a:txBody>
+                    <a:bodyPr/>
+                    <a:lstStyle/>
+                    <a:p>
+                      <a:pPr marL="0" marR="0" indent="0" algn="ctr" defTabSz="914400" rtl="0" eaLnBrk="1" fontAlgn="auto" latinLnBrk="0" hangingPunct="1">
+                        <a:lnSpc>
+                          <a:spcPct val="115000"/>
+                        </a:lnSpc>
+                        <a:spcBef>
+                          <a:spcPts val="0"/>
+                        </a:spcBef>
+                        <a:spcAft>
+                          <a:spcPts val="0"/>
+                        </a:spcAft>
+                        <a:buClrTx/>
+                        <a:buSzTx/>
+                        <a:buFontTx/>
+                        <a:buNone/>
+                        <a:tabLst/>
+                        <a:defRPr/>
+                      </a:pPr>
+                      <a:r>
+                        <a:rPr lang="fr-FR" sz="1100" kern="1200" dirty="0"/>
+                        <a:t>0.00</a:t>
+                      </a:r>
+                      <a:endParaRPr lang="en-IN" sz="1100" dirty="0">
+                        <a:solidFill>
+                          <a:srgbClr val="365F91"/>
+                        </a:solidFill>
+                        <a:effectLst/>
+                        <a:latin typeface="+mn-lt"/>
+                        <a:ea typeface="Calibri"/>
+                        <a:cs typeface="Times New Roman"/>
+                      </a:endParaRPr>
+                    </a:p>
+                  </a:txBody>
+                  <a:tcPr marL="68580" marR="68580" marT="0" marB="0" anchor="ctr"/>
+                </a:tc>
+                <a:tc>
+                  <a:txBody>
+                    <a:bodyPr/>
+                    <a:lstStyle/>
+                    <a:p>
+                      <a:pPr algn="ctr">
+                        <a:lnSpc>
+                          <a:spcPct val="115000"/>
+                        </a:lnSpc>
+                        <a:spcAft>
+                          <a:spcPts val="0"/>
+                        </a:spcAft>
+                      </a:pPr>
+                      <a:r>
+                        <a:rPr lang="fr-FR" sz="1100" kern="1200" dirty="0"/>
+                        <a:t>0.00</a:t>
+                      </a:r>
+                      <a:endParaRPr lang="en-IN" sz="1100" dirty="0">
+                        <a:solidFill>
+                          <a:srgbClr val="365F91"/>
+                        </a:solidFill>
+                        <a:effectLst/>
+                        <a:latin typeface="Calibri"/>
+                        <a:ea typeface="Calibri"/>
+                        <a:cs typeface="Times New Roman"/>
+                      </a:endParaRPr>
+                    </a:p>
+                  </a:txBody>
+                  <a:tcPr marL="68580" marR="68580" marT="0" marB="0" anchor="ctr"/>
+                </a:tc>
+                <a:tc>
+                  <a:txBody>
+                    <a:bodyPr/>
+                    <a:lstStyle/>
+                    <a:p>
+                      <a:pPr marL="0" marR="0" indent="0" algn="ctr" defTabSz="914400" rtl="0" eaLnBrk="1" fontAlgn="auto" latinLnBrk="0" hangingPunct="1">
+                        <a:lnSpc>
+                          <a:spcPct val="115000"/>
+                        </a:lnSpc>
+                        <a:spcBef>
+                          <a:spcPts val="0"/>
+                        </a:spcBef>
+                        <a:spcAft>
+                          <a:spcPts val="0"/>
+                        </a:spcAft>
+                        <a:buClrTx/>
+                        <a:buSzTx/>
+                        <a:buFontTx/>
+                        <a:buNone/>
+                        <a:tabLst/>
+                        <a:defRPr/>
+                      </a:pPr>
+                      <a:r>
+                        <a:rPr lang="en-US" sz="1100" dirty="0">
+                          <a:effectLst/>
+                        </a:rPr>
+                        <a:t>Good</a:t>
+                      </a:r>
+                      <a:endParaRPr lang="en-IN" sz="1100" dirty="0">
+                        <a:solidFill>
+                          <a:schemeClr val="tx1"/>
+                        </a:solidFill>
+                        <a:effectLst/>
+                        <a:latin typeface="+mn-lt"/>
+                        <a:ea typeface="Calibri"/>
+                        <a:cs typeface="Times New Roman"/>
+                      </a:endParaRPr>
+                    </a:p>
+                  </a:txBody>
+                  <a:tcPr marL="68580" marR="68580" marT="0" marB="0" anchor="ctr"/>
+                </a:tc>
+                <a:extLst>
+                  <a:ext uri="{0D108BD9-81ED-4DB2-BD59-A6C34878D82A}">
+                    <a16:rowId xmlns:a16="http://schemas.microsoft.com/office/drawing/2014/main" val="10003"/>
+                  </a:ext>
+                </a:extLst>
+              </a:tr>
+              <a:tr h="276729">
+                <a:tc>
+                  <a:txBody>
+                    <a:bodyPr/>
+                    <a:lstStyle/>
+                    <a:p>
+                      <a:pPr marL="0" marR="0" lvl="0" indent="0" algn="l" defTabSz="914400" rtl="0" eaLnBrk="1" fontAlgn="auto" latinLnBrk="0" hangingPunct="1">
+                        <a:lnSpc>
+                          <a:spcPct val="115000"/>
+                        </a:lnSpc>
+                        <a:spcBef>
+                          <a:spcPts val="0"/>
+                        </a:spcBef>
+                        <a:spcAft>
+                          <a:spcPts val="0"/>
+                        </a:spcAft>
+                        <a:buClrTx/>
+                        <a:buSzTx/>
+                        <a:buFontTx/>
+                        <a:buNone/>
+                        <a:tabLst/>
+                        <a:defRPr/>
+                      </a:pPr>
+                      <a:r>
+                        <a:rPr lang="en-US" sz="1100" dirty="0">
+                          <a:effectLst/>
+                        </a:rPr>
+                        <a:t>Avoid Classes with a very low comment/code ratio (7780)</a:t>
+                      </a:r>
+                      <a:endParaRPr lang="en-IN" sz="1100" dirty="0">
+                        <a:solidFill>
+                          <a:srgbClr val="365F91"/>
+                        </a:solidFill>
+                        <a:effectLst/>
+                        <a:latin typeface="Calibri"/>
+                        <a:ea typeface="Calibri"/>
+                        <a:cs typeface="Times New Roman"/>
+                      </a:endParaRPr>
+                    </a:p>
+                  </a:txBody>
+                  <a:tcPr marL="68580" marR="68580" marT="0" marB="0" anchor="ctr"/>
+                </a:tc>
+                <a:tc>
+                  <a:txBody>
+                    <a:bodyPr/>
+                    <a:lstStyle/>
+                    <a:p>
+                      <a:pPr algn="ctr">
+                        <a:lnSpc>
+                          <a:spcPct val="115000"/>
+                        </a:lnSpc>
+                        <a:spcAft>
+                          <a:spcPts val="0"/>
+                        </a:spcAft>
+                      </a:pPr>
+                      <a:r>
+                        <a:rPr lang="fr-FR" sz="1100" kern="1200" dirty="0"/>
+                        <a:t>0.00</a:t>
+                      </a:r>
+                      <a:endParaRPr lang="en-IN" sz="1100" dirty="0">
+                        <a:solidFill>
+                          <a:srgbClr val="365F91"/>
+                        </a:solidFill>
+                        <a:effectLst/>
+                        <a:latin typeface="Calibri"/>
+                        <a:ea typeface="Calibri"/>
+                        <a:cs typeface="Times New Roman"/>
+                      </a:endParaRPr>
+                    </a:p>
+                  </a:txBody>
+                  <a:tcPr marL="68580" marR="68580" marT="0" marB="0" anchor="ctr"/>
+                </a:tc>
+                <a:tc>
+                  <a:txBody>
+                    <a:bodyPr/>
+                    <a:lstStyle/>
+                    <a:p>
+                      <a:pPr marL="0" marR="0" indent="0" algn="ctr" defTabSz="914400" rtl="0" eaLnBrk="1" fontAlgn="auto" latinLnBrk="0" hangingPunct="1">
+                        <a:lnSpc>
+                          <a:spcPct val="115000"/>
+                        </a:lnSpc>
+                        <a:spcBef>
+                          <a:spcPts val="0"/>
+                        </a:spcBef>
+                        <a:spcAft>
+                          <a:spcPts val="0"/>
+                        </a:spcAft>
+                        <a:buClrTx/>
+                        <a:buSzTx/>
+                        <a:buFontTx/>
+                        <a:buNone/>
+                        <a:tabLst/>
+                        <a:defRPr/>
+                      </a:pPr>
+                      <a:r>
+                        <a:rPr lang="fr-FR" sz="1100" kern="1200" dirty="0"/>
+                        <a:t>0.00</a:t>
+                      </a:r>
+                      <a:endParaRPr lang="en-IN" sz="1100" dirty="0">
+                        <a:solidFill>
+                          <a:srgbClr val="365F91"/>
+                        </a:solidFill>
+                        <a:effectLst/>
+                        <a:latin typeface="+mn-lt"/>
+                        <a:ea typeface="Calibri"/>
+                        <a:cs typeface="Times New Roman"/>
+                      </a:endParaRPr>
+                    </a:p>
+                  </a:txBody>
+                  <a:tcPr marL="68580" marR="68580" marT="0" marB="0" anchor="ctr"/>
+                </a:tc>
+                <a:tc>
+                  <a:txBody>
+                    <a:bodyPr/>
+                    <a:lstStyle/>
+                    <a:p>
+                      <a:pPr algn="ctr">
+                        <a:lnSpc>
+                          <a:spcPct val="115000"/>
+                        </a:lnSpc>
+                        <a:spcAft>
+                          <a:spcPts val="0"/>
+                        </a:spcAft>
+                      </a:pPr>
+                      <a:r>
+                        <a:rPr lang="fr-FR" sz="1100" kern="1200" dirty="0"/>
+                        <a:t>0.00</a:t>
+                      </a:r>
+                      <a:endParaRPr lang="en-IN" sz="1100" dirty="0">
+                        <a:solidFill>
+                          <a:srgbClr val="365F91"/>
+                        </a:solidFill>
+                        <a:effectLst/>
+                        <a:latin typeface="Calibri"/>
+                        <a:ea typeface="Calibri"/>
+                        <a:cs typeface="Times New Roman"/>
+                      </a:endParaRPr>
+                    </a:p>
+                  </a:txBody>
+                  <a:tcPr marL="68580" marR="68580" marT="0" marB="0" anchor="ctr"/>
+                </a:tc>
+                <a:tc>
+                  <a:txBody>
+                    <a:bodyPr/>
+                    <a:lstStyle/>
+                    <a:p>
+                      <a:pPr marL="0" marR="0" indent="0" algn="ctr" defTabSz="914400" rtl="0" eaLnBrk="1" fontAlgn="auto" latinLnBrk="0" hangingPunct="1">
+                        <a:lnSpc>
+                          <a:spcPct val="115000"/>
+                        </a:lnSpc>
+                        <a:spcBef>
+                          <a:spcPts val="0"/>
+                        </a:spcBef>
+                        <a:spcAft>
+                          <a:spcPts val="0"/>
+                        </a:spcAft>
+                        <a:buClrTx/>
+                        <a:buSzTx/>
+                        <a:buFontTx/>
+                        <a:buNone/>
+                        <a:tabLst/>
+                        <a:defRPr/>
+                      </a:pPr>
+                      <a:r>
+                        <a:rPr lang="en-US" sz="1100" dirty="0">
+                          <a:effectLst/>
+                        </a:rPr>
+                        <a:t>Good</a:t>
+                      </a:r>
+                      <a:endParaRPr lang="en-IN" sz="1100" dirty="0">
+                        <a:solidFill>
+                          <a:schemeClr val="tx1"/>
+                        </a:solidFill>
+                        <a:effectLst/>
+                        <a:latin typeface="+mn-lt"/>
+                        <a:ea typeface="Calibri"/>
+                        <a:cs typeface="Times New Roman"/>
+                      </a:endParaRPr>
+                    </a:p>
+                  </a:txBody>
+                  <a:tcPr marL="68580" marR="68580" marT="0" marB="0" anchor="ctr"/>
+                </a:tc>
+                <a:extLst>
+                  <a:ext uri="{0D108BD9-81ED-4DB2-BD59-A6C34878D82A}">
+                    <a16:rowId xmlns:a16="http://schemas.microsoft.com/office/drawing/2014/main" val="2379241525"/>
+                  </a:ext>
+                </a:extLst>
+              </a:tr>
+            </a:tbl>
+          </a:graphicData>
+        </a:graphic>
+      </p:graphicFrame>
+      <p:sp>
+        <p:nvSpPr>
+          <p:cNvPr id="19" name="TextBox 18"/>
+          <p:cNvSpPr txBox="1"/>
+          <p:nvPr/>
+        </p:nvSpPr>
+        <p:spPr>
+          <a:xfrm>
+            <a:off x="1239152" y="2708920"/>
+            <a:ext cx="800219" cy="369332"/>
+          </a:xfrm>
+          <a:prstGeom prst="rect">
+            <a:avLst/>
+          </a:prstGeom>
+          <a:noFill/>
+        </p:spPr>
+        <p:txBody>
+          <a:bodyPr wrap="none" rtlCol="0">
+            <a:spAutoFit/>
+          </a:bodyPr>
+          <a:lstStyle>
+            <a:defPPr>
+              <a:defRPr lang="fr-FR"/>
+            </a:defPPr>
+            <a:lvl1pPr algn="r">
+              <a:defRPr sz="2000">
+                <a:solidFill>
+                  <a:schemeClr val="bg1">
+                    <a:lumMod val="50000"/>
+                  </a:schemeClr>
+                </a:solidFill>
+              </a:defRPr>
+            </a:lvl1pPr>
+          </a:lstStyle>
+          <a:p>
+            <a:r>
+              <a:rPr lang="en-US" sz="1800" dirty="0"/>
+              <a:t>Note :</a:t>
+            </a:r>
+          </a:p>
+        </p:txBody>
+      </p:sp>
+      <p:sp>
+        <p:nvSpPr>
+          <p:cNvPr id="18" name="Rectangle 17"/>
+          <p:cNvSpPr/>
+          <p:nvPr/>
+        </p:nvSpPr>
+        <p:spPr>
+          <a:xfrm>
+            <a:off x="1943741" y="2777512"/>
+            <a:ext cx="6702476" cy="1785104"/>
+          </a:xfrm>
+          <a:prstGeom prst="rect">
+            <a:avLst/>
+          </a:prstGeom>
+          <a:noFill/>
+        </p:spPr>
+        <p:txBody>
+          <a:bodyPr wrap="none" rtlCol="0">
+            <a:spAutoFit/>
+          </a:bodyPr>
+          <a:lstStyle/>
+          <a:p>
+            <a:r>
+              <a:rPr lang="en-US" sz="1100" b="1" dirty="0">
+                <a:solidFill>
+                  <a:schemeClr val="bg1">
+                    <a:lumMod val="50000"/>
+                  </a:schemeClr>
+                </a:solidFill>
+              </a:rPr>
+              <a:t>-SLA Assessment thresholds</a:t>
+            </a:r>
+          </a:p>
+          <a:p>
+            <a:pPr lvl="1"/>
+            <a:r>
+              <a:rPr lang="en-US" sz="1100" dirty="0">
+                <a:solidFill>
+                  <a:schemeClr val="bg1">
+                    <a:lumMod val="50000"/>
+                  </a:schemeClr>
+                </a:solidFill>
+              </a:rPr>
+              <a:t>Good if % difference between Target and Actual is less than 2%</a:t>
+            </a:r>
+          </a:p>
+          <a:p>
+            <a:pPr lvl="1"/>
+            <a:r>
+              <a:rPr lang="en-US" sz="1100" dirty="0">
+                <a:solidFill>
+                  <a:schemeClr val="bg1">
+                    <a:lumMod val="50000"/>
+                  </a:schemeClr>
+                </a:solidFill>
+              </a:rPr>
+              <a:t>Acceptable if &amp; difference between Target and Actual is between 2% and 5%</a:t>
+            </a:r>
+          </a:p>
+          <a:p>
+            <a:pPr lvl="1"/>
+            <a:r>
+              <a:rPr lang="en-US" sz="1100" dirty="0">
+                <a:solidFill>
+                  <a:schemeClr val="bg1">
+                    <a:lumMod val="50000"/>
+                  </a:schemeClr>
+                </a:solidFill>
+              </a:rPr>
+              <a:t>Poor if % difference between Target and Actual is greater than 5%</a:t>
+            </a:r>
+          </a:p>
+          <a:p>
+            <a:r>
+              <a:rPr lang="en-US" sz="1100" b="1" dirty="0">
+                <a:solidFill>
+                  <a:schemeClr val="bg1">
+                    <a:lumMod val="50000"/>
+                  </a:schemeClr>
+                </a:solidFill>
+              </a:rPr>
+              <a:t>-Actual score</a:t>
+            </a:r>
+            <a:r>
+              <a:rPr lang="en-US" sz="1100" dirty="0">
+                <a:solidFill>
+                  <a:schemeClr val="bg1">
+                    <a:lumMod val="50000"/>
+                  </a:schemeClr>
+                </a:solidFill>
+              </a:rPr>
+              <a:t>: for each app, score from latest snapshot (even if snapshot date is before current quarter), </a:t>
+            </a:r>
+            <a:br>
+              <a:rPr lang="en-US" sz="1100" dirty="0">
+                <a:solidFill>
+                  <a:schemeClr val="bg1">
+                    <a:lumMod val="50000"/>
+                  </a:schemeClr>
+                </a:solidFill>
+              </a:rPr>
+            </a:br>
+            <a:r>
+              <a:rPr lang="en-US" sz="1100" dirty="0">
+                <a:solidFill>
+                  <a:schemeClr val="bg1">
+                    <a:lumMod val="50000"/>
+                  </a:schemeClr>
+                </a:solidFill>
+              </a:rPr>
+              <a:t>then average for all apps</a:t>
+            </a:r>
+          </a:p>
+          <a:p>
+            <a:r>
+              <a:rPr lang="en-US" sz="1100" b="1" dirty="0">
+                <a:solidFill>
+                  <a:schemeClr val="bg1">
+                    <a:lumMod val="50000"/>
+                  </a:schemeClr>
+                </a:solidFill>
+              </a:rPr>
+              <a:t>-Target score</a:t>
+            </a:r>
+            <a:r>
+              <a:rPr lang="en-US" sz="1100" dirty="0">
+                <a:solidFill>
+                  <a:schemeClr val="bg1">
+                    <a:lumMod val="50000"/>
+                  </a:schemeClr>
+                </a:solidFill>
+              </a:rPr>
+              <a:t>: score to reach, to be configured as an option of the component. </a:t>
+            </a:r>
+          </a:p>
+          <a:p>
+            <a:r>
+              <a:rPr lang="en-US" sz="1100" b="1" dirty="0">
+                <a:solidFill>
+                  <a:schemeClr val="bg1">
+                    <a:lumMod val="50000"/>
+                  </a:schemeClr>
+                </a:solidFill>
+              </a:rPr>
+              <a:t>-Previous quarter</a:t>
+            </a:r>
+            <a:r>
+              <a:rPr lang="en-US" sz="1100" dirty="0">
+                <a:solidFill>
+                  <a:schemeClr val="bg1">
+                    <a:lumMod val="50000"/>
+                  </a:schemeClr>
+                </a:solidFill>
+              </a:rPr>
+              <a:t>: for each app, score from latest snapshot in previous quarter (even if snapshot date is </a:t>
+            </a:r>
+            <a:br>
+              <a:rPr lang="en-US" sz="1100" dirty="0">
+                <a:solidFill>
+                  <a:schemeClr val="bg1">
+                    <a:lumMod val="50000"/>
+                  </a:schemeClr>
+                </a:solidFill>
+              </a:rPr>
+            </a:br>
+            <a:r>
+              <a:rPr lang="en-US" sz="1100" dirty="0">
+                <a:solidFill>
+                  <a:schemeClr val="bg1">
+                    <a:lumMod val="50000"/>
+                  </a:schemeClr>
+                </a:solidFill>
+              </a:rPr>
+              <a:t>before previous quarter). then average for all apps</a:t>
+            </a:r>
+          </a:p>
+          <a:p>
+            <a:endParaRPr lang="en-US" sz="1100" dirty="0">
+              <a:solidFill>
+                <a:schemeClr val="bg1">
+                  <a:lumMod val="50000"/>
+                </a:schemeClr>
+              </a:solidFill>
+            </a:endParaRPr>
+          </a:p>
+        </p:txBody>
+      </p:sp>
+      <p:sp>
+        <p:nvSpPr>
+          <p:cNvPr id="2" name="TextBox 1">
+            <a:extLst>
+              <a:ext uri="{FF2B5EF4-FFF2-40B4-BE49-F238E27FC236}">
+                <a16:creationId xmlns:a16="http://schemas.microsoft.com/office/drawing/2014/main" id="{F912DBB0-DFAA-4F53-81AA-BCAA81737FD9}"/>
+              </a:ext>
+            </a:extLst>
+          </p:cNvPr>
+          <p:cNvSpPr txBox="1"/>
+          <p:nvPr/>
+        </p:nvSpPr>
+        <p:spPr>
+          <a:xfrm>
+            <a:off x="7414121" y="1027185"/>
+            <a:ext cx="864096" cy="461665"/>
+          </a:xfrm>
+          <a:prstGeom prst="rect">
+            <a:avLst/>
+          </a:prstGeom>
+        </p:spPr>
+        <p:txBody>
+          <a:bodyPr vert="horz" wrap="square" lIns="45720" tIns="45720" rIns="45720" bIns="45720" rtlCol="0">
+            <a:spAutoFit/>
+          </a:bodyPr>
+          <a:lstStyle/>
+          <a:p>
+            <a:pPr marL="1587">
+              <a:spcBef>
+                <a:spcPts val="300"/>
+              </a:spcBef>
+              <a:spcAft>
+                <a:spcPts val="400"/>
+              </a:spcAft>
+              <a:buClr>
+                <a:schemeClr val="tx2">
+                  <a:lumMod val="65000"/>
+                  <a:lumOff val="35000"/>
+                </a:schemeClr>
+              </a:buClr>
+              <a:buSzPct val="95000"/>
+            </a:pPr>
+            <a:r>
+              <a:rPr lang="en-US" sz="2400" b="1" dirty="0">
+                <a:solidFill>
+                  <a:srgbClr val="FF0000"/>
+                </a:solidFill>
+                <a:latin typeface="+mn-lt"/>
+                <a:cs typeface="Arial" pitchFamily="34" charset="0"/>
+              </a:rPr>
+              <a:t>NEW</a:t>
+            </a:r>
+          </a:p>
+        </p:txBody>
+      </p:sp>
+    </p:spTree>
+    <p:extLst>
+      <p:ext uri="{BB962C8B-B14F-4D97-AF65-F5344CB8AC3E}">
+        <p14:creationId xmlns:p14="http://schemas.microsoft.com/office/powerpoint/2010/main" val="49455635"/>
+      </p:ext>
+    </p:extLst>
+  </p:cSld>
+  <p:clrMapOvr>
+    <a:masterClrMapping/>
+  </p:clrMapOvr>
+</p:sld>
+</file>
+
+<file path=ppt/slides/slide25.xml><?xml version="1.0" encoding="utf-8"?>
 <p:sld xmlns:a="http://schemas.openxmlformats.org/drawingml/2006/main" xmlns:r="http://schemas.openxmlformats.org/officeDocument/2006/relationships" xmlns:p="http://schemas.openxmlformats.org/presentationml/2006/main">
   <p:cSld>
     <p:spTree>
@@ -29923,7 +31517,7 @@
 </p:sld>
 </file>
 
-<file path=ppt/slides/slide25.xml><?xml version="1.0" encoding="utf-8"?>
+<file path=ppt/slides/slide26.xml><?xml version="1.0" encoding="utf-8"?>
 <p:sld xmlns:a="http://schemas.openxmlformats.org/drawingml/2006/main" xmlns:r="http://schemas.openxmlformats.org/officeDocument/2006/relationships" xmlns:p="http://schemas.openxmlformats.org/presentationml/2006/main">
   <p:cSld>
     <p:spTree>
@@ -29974,7 +31568,7 @@
                   <a:prstClr val="black"/>
                 </a:buClr>
               </a:pPr>
-              <a:t>25</a:t>
+              <a:t>26</a:t>
             </a:fld>
             <a:endParaRPr lang="en-US" dirty="0">
               <a:solidFill>

</xml_diff>

<commit_message>
REPORTGEN-0000 : update library template reports
</commit_message>
<xml_diff>
--- a/CastReporting.Reporting.Core/Templates/Portfolio/Portfolio component library/1- Portfolio-Powerpoint-components-library.pptx
+++ b/CastReporting.Reporting.Core/Templates/Portfolio/Portfolio component library/1- Portfolio-Powerpoint-components-library.pptx
@@ -2181,7 +2181,7 @@
           <a:p>
             <a:fld id="{268042A1-6D91-4513-A62D-1E3FD70C84BE}" type="datetimeFigureOut">
               <a:rPr lang="fr-FR" smtClean="0"/>
-              <a:t>24/03/2020</a:t>
+              <a:t>09/07/2020</a:t>
             </a:fld>
             <a:endParaRPr lang="fr-FR"/>
           </a:p>
@@ -2779,7 +2779,7 @@
             <a:fld id="{D8E3BBD6-5DF7-411E-B793-6A3558CCCDCA}" type="datetimeFigureOut">
               <a:rPr lang="fr-FR" smtClean="0"/>
               <a:pPr/>
-              <a:t>24/03/2020</a:t>
+              <a:t>09/07/2020</a:t>
             </a:fld>
             <a:endParaRPr lang="fr-FR" dirty="0"/>
           </a:p>
@@ -2942,7 +2942,7 @@
             <a:fld id="{D8E3BBD6-5DF7-411E-B793-6A3558CCCDCA}" type="datetimeFigureOut">
               <a:rPr lang="fr-FR" smtClean="0"/>
               <a:pPr/>
-              <a:t>24/03/2020</a:t>
+              <a:t>09/07/2020</a:t>
             </a:fld>
             <a:endParaRPr lang="fr-FR" dirty="0"/>
           </a:p>
@@ -4447,7 +4447,7 @@
             <a:fld id="{D8E3BBD6-5DF7-411E-B793-6A3558CCCDCA}" type="datetimeFigureOut">
               <a:rPr lang="fr-FR" smtClean="0"/>
               <a:pPr/>
-              <a:t>24/03/2020</a:t>
+              <a:t>09/07/2020</a:t>
             </a:fld>
             <a:endParaRPr lang="fr-FR" dirty="0"/>
           </a:p>
@@ -6807,7 +6807,7 @@
             <a:fld id="{D8E3BBD6-5DF7-411E-B793-6A3558CCCDCA}" type="datetimeFigureOut">
               <a:rPr lang="fr-FR" smtClean="0"/>
               <a:pPr/>
-              <a:t>24/03/2020</a:t>
+              <a:t>09/07/2020</a:t>
             </a:fld>
             <a:endParaRPr lang="fr-FR" dirty="0"/>
           </a:p>
@@ -9433,7 +9433,7 @@
             <a:fld id="{D8E3BBD6-5DF7-411E-B793-6A3558CCCDCA}" type="datetimeFigureOut">
               <a:rPr lang="fr-FR" smtClean="0"/>
               <a:pPr/>
-              <a:t>24/03/2020</a:t>
+              <a:t>09/07/2020</a:t>
             </a:fld>
             <a:endParaRPr lang="fr-FR" dirty="0"/>
           </a:p>
@@ -12342,7 +12342,7 @@
             <a:fld id="{D8E3BBD6-5DF7-411E-B793-6A3558CCCDCA}" type="datetimeFigureOut">
               <a:rPr lang="fr-FR" smtClean="0"/>
               <a:pPr/>
-              <a:t>24/03/2020</a:t>
+              <a:t>09/07/2020</a:t>
             </a:fld>
             <a:endParaRPr lang="fr-FR" dirty="0"/>
           </a:p>
@@ -14126,7 +14126,7 @@
             <a:fld id="{D8E3BBD6-5DF7-411E-B793-6A3558CCCDCA}" type="datetimeFigureOut">
               <a:rPr lang="fr-FR" smtClean="0"/>
               <a:pPr/>
-              <a:t>24/03/2020</a:t>
+              <a:t>09/07/2020</a:t>
             </a:fld>
             <a:endParaRPr lang="fr-FR" dirty="0"/>
           </a:p>
@@ -14206,7 +14206,7 @@
             <a:fld id="{D8E3BBD6-5DF7-411E-B793-6A3558CCCDCA}" type="datetimeFigureOut">
               <a:rPr lang="fr-FR" smtClean="0"/>
               <a:pPr/>
-              <a:t>24/03/2020</a:t>
+              <a:t>09/07/2020</a:t>
             </a:fld>
             <a:endParaRPr lang="fr-FR" dirty="0"/>
           </a:p>
@@ -14466,7 +14466,7 @@
             <a:fld id="{D8E3BBD6-5DF7-411E-B793-6A3558CCCDCA}" type="datetimeFigureOut">
               <a:rPr lang="fr-FR" smtClean="0"/>
               <a:pPr/>
-              <a:t>24/03/2020</a:t>
+              <a:t>09/07/2020</a:t>
             </a:fld>
             <a:endParaRPr lang="fr-FR" dirty="0"/>
           </a:p>
@@ -14708,7 +14708,7 @@
             <a:fld id="{D8E3BBD6-5DF7-411E-B793-6A3558CCCDCA}" type="datetimeFigureOut">
               <a:rPr lang="fr-FR" smtClean="0"/>
               <a:pPr/>
-              <a:t>24/03/2020</a:t>
+              <a:t>09/07/2020</a:t>
             </a:fld>
             <a:endParaRPr lang="fr-FR" dirty="0"/>
           </a:p>
@@ -14910,7 +14910,7 @@
             <a:fld id="{D8E3BBD6-5DF7-411E-B793-6A3558CCCDCA}" type="datetimeFigureOut">
               <a:rPr lang="fr-FR" smtClean="0"/>
               <a:pPr/>
-              <a:t>24/03/2020</a:t>
+              <a:t>09/07/2020</a:t>
             </a:fld>
             <a:endParaRPr lang="fr-FR" dirty="0"/>
           </a:p>
@@ -30285,61 +30285,6 @@
                 </a:schemeClr>
               </a:solidFill>
             </a:endParaRPr>
-          </a:p>
-        </p:txBody>
-      </p:sp>
-      <p:sp>
-        <p:nvSpPr>
-          <p:cNvPr id="2" name="TextBox 1">
-            <a:extLst>
-              <a:ext uri="{FF2B5EF4-FFF2-40B4-BE49-F238E27FC236}">
-                <a16:creationId xmlns:a16="http://schemas.microsoft.com/office/drawing/2014/main" id="{F912DBB0-DFAA-4F53-81AA-BCAA81737FD9}"/>
-              </a:ext>
-            </a:extLst>
-          </p:cNvPr>
-          <p:cNvSpPr txBox="1"/>
-          <p:nvPr/>
-        </p:nvSpPr>
-        <p:spPr>
-          <a:xfrm>
-            <a:off x="7414121" y="1027185"/>
-            <a:ext cx="864096" cy="461665"/>
-          </a:xfrm>
-          <a:prstGeom prst="rect">
-            <a:avLst/>
-          </a:prstGeom>
-        </p:spPr>
-        <p:txBody>
-          <a:bodyPr vert="horz" wrap="square" lIns="45720" tIns="45720" rIns="45720" bIns="45720" rtlCol="0">
-            <a:spAutoFit/>
-          </a:bodyPr>
-          <a:lstStyle/>
-          <a:p>
-            <a:pPr marL="1587">
-              <a:spcBef>
-                <a:spcPts val="300"/>
-              </a:spcBef>
-              <a:spcAft>
-                <a:spcPts val="400"/>
-              </a:spcAft>
-              <a:buClr>
-                <a:schemeClr val="tx2">
-                  <a:lumMod val="65000"/>
-                  <a:lumOff val="35000"/>
-                </a:schemeClr>
-              </a:buClr>
-              <a:buSzPct val="95000"/>
-            </a:pPr>
-            <a:r>
-              <a:rPr lang="en-US" sz="2400" b="1" dirty="0">
-                <a:solidFill>
-                  <a:srgbClr val="FF0000"/>
-                </a:solidFill>
-                <a:latin typeface="+mn-lt"/>
-                <a:cs typeface="Arial" pitchFamily="34" charset="0"/>
-              </a:rPr>
-              <a:t>NEW</a:t>
-            </a:r>
           </a:p>
         </p:txBody>
       </p:sp>

</xml_diff>

<commit_message>
REPORTGEN-1058: update portfolio library reports
</commit_message>
<xml_diff>
--- a/CastReporting.Reporting.Core/Templates/Portfolio/Portfolio component library/1- Portfolio-Powerpoint-components-library.pptx
+++ b/CastReporting.Reporting.Core/Templates/Portfolio/Portfolio component library/1- Portfolio-Powerpoint-components-library.pptx
@@ -10,7 +10,7 @@
     <p:sldMasterId id="2147483713" r:id="rId6"/>
   </p:sldMasterIdLst>
   <p:notesMasterIdLst>
-    <p:notesMasterId r:id="rId33"/>
+    <p:notesMasterId r:id="rId35"/>
   </p:notesMasterIdLst>
   <p:sldIdLst>
     <p:sldId id="262" r:id="rId7"/>
@@ -24,21 +24,23 @@
     <p:sldId id="271" r:id="rId15"/>
     <p:sldId id="321" r:id="rId16"/>
     <p:sldId id="324" r:id="rId17"/>
-    <p:sldId id="334" r:id="rId18"/>
-    <p:sldId id="295" r:id="rId19"/>
-    <p:sldId id="276" r:id="rId20"/>
-    <p:sldId id="279" r:id="rId21"/>
-    <p:sldId id="331" r:id="rId22"/>
-    <p:sldId id="297" r:id="rId23"/>
-    <p:sldId id="336" r:id="rId24"/>
-    <p:sldId id="294" r:id="rId25"/>
-    <p:sldId id="280" r:id="rId26"/>
-    <p:sldId id="332" r:id="rId27"/>
-    <p:sldId id="303" r:id="rId28"/>
-    <p:sldId id="335" r:id="rId29"/>
-    <p:sldId id="337" r:id="rId30"/>
-    <p:sldId id="333" r:id="rId31"/>
-    <p:sldId id="318" r:id="rId32"/>
+    <p:sldId id="338" r:id="rId18"/>
+    <p:sldId id="334" r:id="rId19"/>
+    <p:sldId id="295" r:id="rId20"/>
+    <p:sldId id="276" r:id="rId21"/>
+    <p:sldId id="339" r:id="rId22"/>
+    <p:sldId id="279" r:id="rId23"/>
+    <p:sldId id="331" r:id="rId24"/>
+    <p:sldId id="297" r:id="rId25"/>
+    <p:sldId id="336" r:id="rId26"/>
+    <p:sldId id="294" r:id="rId27"/>
+    <p:sldId id="280" r:id="rId28"/>
+    <p:sldId id="332" r:id="rId29"/>
+    <p:sldId id="303" r:id="rId30"/>
+    <p:sldId id="335" r:id="rId31"/>
+    <p:sldId id="337" r:id="rId32"/>
+    <p:sldId id="333" r:id="rId33"/>
+    <p:sldId id="318" r:id="rId34"/>
   </p:sldIdLst>
   <p:sldSz cx="9144000" cy="6858000" type="screen4x3"/>
   <p:notesSz cx="6858000" cy="9144000"/>
@@ -454,6 +456,397 @@
           <c:layoutTarget val="inner"/>
           <c:xMode val="edge"/>
           <c:yMode val="edge"/>
+          <c:x val="9.2302551437254132E-2"/>
+          <c:y val="8.7498611265414819E-2"/>
+          <c:w val="0.56561170983379505"/>
+          <c:h val="0.56134497937051908"/>
+        </c:manualLayout>
+      </c:layout>
+      <c:barChart>
+        <c:barDir val="col"/>
+        <c:grouping val="stacked"/>
+        <c:varyColors val="0"/>
+        <c:ser>
+          <c:idx val="0"/>
+          <c:order val="0"/>
+          <c:tx>
+            <c:strRef>
+              <c:f>Sheet1!$B$1</c:f>
+              <c:strCache>
+                <c:ptCount val="1"/>
+                <c:pt idx="0">
+                  <c:v>Debt removed (Days)</c:v>
+                </c:pt>
+              </c:strCache>
+            </c:strRef>
+          </c:tx>
+          <c:spPr>
+            <a:solidFill>
+              <a:schemeClr val="tx1">
+                <a:lumMod val="85000"/>
+                <a:lumOff val="15000"/>
+              </a:schemeClr>
+            </a:solidFill>
+            <a:ln w="12700">
+              <a:noFill/>
+            </a:ln>
+          </c:spPr>
+          <c:invertIfNegative val="0"/>
+          <c:cat>
+            <c:strRef>
+              <c:f>Sheet1!$A$2:$A$5</c:f>
+              <c:strCache>
+                <c:ptCount val="4"/>
+                <c:pt idx="0">
+                  <c:v>Q1</c:v>
+                </c:pt>
+                <c:pt idx="1">
+                  <c:v>Q2</c:v>
+                </c:pt>
+                <c:pt idx="2">
+                  <c:v>Q3</c:v>
+                </c:pt>
+                <c:pt idx="3">
+                  <c:v>Q4</c:v>
+                </c:pt>
+              </c:strCache>
+            </c:strRef>
+          </c:cat>
+          <c:val>
+            <c:numRef>
+              <c:f>Sheet1!$B$2:$B$5</c:f>
+              <c:numCache>
+                <c:formatCode>#,##0</c:formatCode>
+                <c:ptCount val="4"/>
+                <c:pt idx="0">
+                  <c:v>-210</c:v>
+                </c:pt>
+                <c:pt idx="1">
+                  <c:v>-60</c:v>
+                </c:pt>
+                <c:pt idx="2">
+                  <c:v>-180</c:v>
+                </c:pt>
+                <c:pt idx="3">
+                  <c:v>-120</c:v>
+                </c:pt>
+              </c:numCache>
+            </c:numRef>
+          </c:val>
+          <c:extLst>
+            <c:ext xmlns:c16="http://schemas.microsoft.com/office/drawing/2014/chart" uri="{C3380CC4-5D6E-409C-BE32-E72D297353CC}">
+              <c16:uniqueId val="{00000000-B079-400E-8814-167D55B7D281}"/>
+            </c:ext>
+          </c:extLst>
+        </c:ser>
+        <c:ser>
+          <c:idx val="1"/>
+          <c:order val="1"/>
+          <c:tx>
+            <c:strRef>
+              <c:f>Sheet1!$C$1</c:f>
+              <c:strCache>
+                <c:ptCount val="1"/>
+                <c:pt idx="0">
+                  <c:v>Debt added (Days)</c:v>
+                </c:pt>
+              </c:strCache>
+            </c:strRef>
+          </c:tx>
+          <c:spPr>
+            <a:solidFill>
+              <a:schemeClr val="accent5">
+                <a:lumMod val="50000"/>
+                <a:lumOff val="50000"/>
+              </a:schemeClr>
+            </a:solidFill>
+            <a:ln w="12700">
+              <a:noFill/>
+            </a:ln>
+          </c:spPr>
+          <c:invertIfNegative val="0"/>
+          <c:cat>
+            <c:strRef>
+              <c:f>Sheet1!$A$2:$A$5</c:f>
+              <c:strCache>
+                <c:ptCount val="4"/>
+                <c:pt idx="0">
+                  <c:v>Q1</c:v>
+                </c:pt>
+                <c:pt idx="1">
+                  <c:v>Q2</c:v>
+                </c:pt>
+                <c:pt idx="2">
+                  <c:v>Q3</c:v>
+                </c:pt>
+                <c:pt idx="3">
+                  <c:v>Q4</c:v>
+                </c:pt>
+              </c:strCache>
+            </c:strRef>
+          </c:cat>
+          <c:val>
+            <c:numRef>
+              <c:f>Sheet1!$C$2:$C$5</c:f>
+              <c:numCache>
+                <c:formatCode>#,##0</c:formatCode>
+                <c:ptCount val="4"/>
+                <c:pt idx="0">
+                  <c:v>280</c:v>
+                </c:pt>
+                <c:pt idx="1">
+                  <c:v>320</c:v>
+                </c:pt>
+                <c:pt idx="2">
+                  <c:v>230</c:v>
+                </c:pt>
+                <c:pt idx="3">
+                  <c:v>130</c:v>
+                </c:pt>
+              </c:numCache>
+            </c:numRef>
+          </c:val>
+          <c:extLst>
+            <c:ext xmlns:c16="http://schemas.microsoft.com/office/drawing/2014/chart" uri="{C3380CC4-5D6E-409C-BE32-E72D297353CC}">
+              <c16:uniqueId val="{00000001-B079-400E-8814-167D55B7D281}"/>
+            </c:ext>
+          </c:extLst>
+        </c:ser>
+        <c:dLbls>
+          <c:showLegendKey val="0"/>
+          <c:showVal val="0"/>
+          <c:showCatName val="0"/>
+          <c:showSerName val="0"/>
+          <c:showPercent val="0"/>
+          <c:showBubbleSize val="0"/>
+        </c:dLbls>
+        <c:gapWidth val="150"/>
+        <c:overlap val="100"/>
+        <c:axId val="487024024"/>
+        <c:axId val="487022456"/>
+      </c:barChart>
+      <c:lineChart>
+        <c:grouping val="standard"/>
+        <c:varyColors val="0"/>
+        <c:ser>
+          <c:idx val="2"/>
+          <c:order val="2"/>
+          <c:tx>
+            <c:strRef>
+              <c:f>Sheet1!$D$1</c:f>
+              <c:strCache>
+                <c:ptCount val="1"/>
+                <c:pt idx="0">
+                  <c:v>Debt (Days)</c:v>
+                </c:pt>
+              </c:strCache>
+            </c:strRef>
+          </c:tx>
+          <c:marker>
+            <c:symbol val="none"/>
+          </c:marker>
+          <c:cat>
+            <c:strRef>
+              <c:f>Sheet1!$A$2:$A$5</c:f>
+              <c:strCache>
+                <c:ptCount val="4"/>
+                <c:pt idx="0">
+                  <c:v>Q1</c:v>
+                </c:pt>
+                <c:pt idx="1">
+                  <c:v>Q2</c:v>
+                </c:pt>
+                <c:pt idx="2">
+                  <c:v>Q3</c:v>
+                </c:pt>
+                <c:pt idx="3">
+                  <c:v>Q4</c:v>
+                </c:pt>
+              </c:strCache>
+            </c:strRef>
+          </c:cat>
+          <c:val>
+            <c:numRef>
+              <c:f>Sheet1!$D$2:$D$5</c:f>
+              <c:numCache>
+                <c:formatCode>#,##0</c:formatCode>
+                <c:ptCount val="4"/>
+                <c:pt idx="0">
+                  <c:v>4700</c:v>
+                </c:pt>
+                <c:pt idx="1">
+                  <c:v>4800</c:v>
+                </c:pt>
+                <c:pt idx="2">
+                  <c:v>4900</c:v>
+                </c:pt>
+                <c:pt idx="3">
+                  <c:v>4800</c:v>
+                </c:pt>
+              </c:numCache>
+            </c:numRef>
+          </c:val>
+          <c:smooth val="0"/>
+          <c:extLst>
+            <c:ext xmlns:c16="http://schemas.microsoft.com/office/drawing/2014/chart" uri="{C3380CC4-5D6E-409C-BE32-E72D297353CC}">
+              <c16:uniqueId val="{00000001-AF03-41D3-B46E-916B9417D1A6}"/>
+            </c:ext>
+          </c:extLst>
+        </c:ser>
+        <c:dLbls>
+          <c:showLegendKey val="0"/>
+          <c:showVal val="0"/>
+          <c:showCatName val="0"/>
+          <c:showSerName val="0"/>
+          <c:showPercent val="0"/>
+          <c:showBubbleSize val="0"/>
+        </c:dLbls>
+        <c:marker val="1"/>
+        <c:smooth val="0"/>
+        <c:axId val="617336192"/>
+        <c:axId val="617336520"/>
+      </c:lineChart>
+      <c:catAx>
+        <c:axId val="487024024"/>
+        <c:scaling>
+          <c:orientation val="minMax"/>
+        </c:scaling>
+        <c:delete val="0"/>
+        <c:axPos val="b"/>
+        <c:numFmt formatCode="General" sourceLinked="1"/>
+        <c:majorTickMark val="out"/>
+        <c:minorTickMark val="none"/>
+        <c:tickLblPos val="low"/>
+        <c:spPr>
+          <a:ln w="12700">
+            <a:solidFill>
+              <a:prstClr val="white">
+                <a:lumMod val="50000"/>
+              </a:prstClr>
+            </a:solidFill>
+          </a:ln>
+        </c:spPr>
+        <c:crossAx val="487022456"/>
+        <c:crosses val="autoZero"/>
+        <c:auto val="0"/>
+        <c:lblAlgn val="ctr"/>
+        <c:lblOffset val="100"/>
+        <c:noMultiLvlLbl val="1"/>
+      </c:catAx>
+      <c:valAx>
+        <c:axId val="487022456"/>
+        <c:scaling>
+          <c:orientation val="minMax"/>
+        </c:scaling>
+        <c:delete val="0"/>
+        <c:axPos val="l"/>
+        <c:majorGridlines/>
+        <c:numFmt formatCode="#,##0" sourceLinked="1"/>
+        <c:majorTickMark val="cross"/>
+        <c:minorTickMark val="none"/>
+        <c:tickLblPos val="nextTo"/>
+        <c:spPr>
+          <a:ln>
+            <a:solidFill>
+              <a:prstClr val="white">
+                <a:lumMod val="50000"/>
+              </a:prstClr>
+            </a:solidFill>
+          </a:ln>
+        </c:spPr>
+        <c:crossAx val="487024024"/>
+        <c:crosses val="autoZero"/>
+        <c:crossBetween val="between"/>
+      </c:valAx>
+      <c:valAx>
+        <c:axId val="617336520"/>
+        <c:scaling>
+          <c:orientation val="minMax"/>
+        </c:scaling>
+        <c:delete val="0"/>
+        <c:axPos val="r"/>
+        <c:numFmt formatCode="#,##0" sourceLinked="1"/>
+        <c:majorTickMark val="out"/>
+        <c:minorTickMark val="none"/>
+        <c:tickLblPos val="nextTo"/>
+        <c:crossAx val="617336192"/>
+        <c:crosses val="max"/>
+        <c:crossBetween val="between"/>
+      </c:valAx>
+      <c:catAx>
+        <c:axId val="617336192"/>
+        <c:scaling>
+          <c:orientation val="minMax"/>
+        </c:scaling>
+        <c:delete val="1"/>
+        <c:axPos val="b"/>
+        <c:numFmt formatCode="General" sourceLinked="1"/>
+        <c:majorTickMark val="out"/>
+        <c:minorTickMark val="none"/>
+        <c:tickLblPos val="nextTo"/>
+        <c:crossAx val="617336520"/>
+        <c:crosses val="autoZero"/>
+        <c:auto val="1"/>
+        <c:lblAlgn val="ctr"/>
+        <c:lblOffset val="100"/>
+        <c:noMultiLvlLbl val="0"/>
+      </c:catAx>
+    </c:plotArea>
+    <c:legend>
+      <c:legendPos val="r"/>
+      <c:layout>
+        <c:manualLayout>
+          <c:xMode val="edge"/>
+          <c:yMode val="edge"/>
+          <c:x val="0.69281308868477065"/>
+          <c:y val="0.68998065871468828"/>
+          <c:w val="0.30718691131522935"/>
+          <c:h val="0.18898014660132068"/>
+        </c:manualLayout>
+      </c:layout>
+      <c:overlay val="0"/>
+    </c:legend>
+    <c:plotVisOnly val="1"/>
+    <c:dispBlanksAs val="gap"/>
+    <c:showDLblsOverMax val="0"/>
+  </c:chart>
+  <c:txPr>
+    <a:bodyPr/>
+    <a:lstStyle/>
+    <a:p>
+      <a:pPr>
+        <a:defRPr sz="1200"/>
+      </a:pPr>
+      <a:endParaRPr lang="en-US"/>
+    </a:p>
+  </c:txPr>
+  <c:externalData r:id="rId1">
+    <c:autoUpdate val="0"/>
+  </c:externalData>
+</c:chartSpace>
+</file>
+
+<file path=ppt/charts/chart3.xml><?xml version="1.0" encoding="utf-8"?>
+<c:chartSpace xmlns:c="http://schemas.openxmlformats.org/drawingml/2006/chart" xmlns:a="http://schemas.openxmlformats.org/drawingml/2006/main" xmlns:r="http://schemas.openxmlformats.org/officeDocument/2006/relationships" xmlns:c16r2="http://schemas.microsoft.com/office/drawing/2015/06/chart">
+  <c:date1904 val="0"/>
+  <c:lang val="en-US"/>
+  <c:roundedCorners val="0"/>
+  <mc:AlternateContent xmlns:mc="http://schemas.openxmlformats.org/markup-compatibility/2006">
+    <mc:Choice xmlns:c14="http://schemas.microsoft.com/office/drawing/2007/8/2/chart" Requires="c14">
+      <c14:style val="102"/>
+    </mc:Choice>
+    <mc:Fallback>
+      <c:style val="2"/>
+    </mc:Fallback>
+  </mc:AlternateContent>
+  <c:chart>
+    <c:autoTitleDeleted val="0"/>
+    <c:plotArea>
+      <c:layout>
+        <c:manualLayout>
+          <c:layoutTarget val="inner"/>
+          <c:xMode val="edge"/>
+          <c:yMode val="edge"/>
           <c:x val="0.12612848888181621"/>
           <c:y val="5.3362798398744228E-2"/>
           <c:w val="0.66369318170176406"/>
@@ -710,7 +1103,7 @@
 </c:chartSpace>
 </file>
 
-<file path=ppt/charts/chart3.xml><?xml version="1.0" encoding="utf-8"?>
+<file path=ppt/charts/chart4.xml><?xml version="1.0" encoding="utf-8"?>
 <c:chartSpace xmlns:c="http://schemas.openxmlformats.org/drawingml/2006/chart" xmlns:a="http://schemas.openxmlformats.org/drawingml/2006/main" xmlns:r="http://schemas.openxmlformats.org/officeDocument/2006/relationships" xmlns:c16r2="http://schemas.microsoft.com/office/drawing/2015/06/chart">
   <c:date1904 val="0"/>
   <c:lang val="en-US"/>
@@ -1898,7 +2291,7 @@
 </c:chartSpace>
 </file>
 
-<file path=ppt/charts/chart4.xml><?xml version="1.0" encoding="utf-8"?>
+<file path=ppt/charts/chart5.xml><?xml version="1.0" encoding="utf-8"?>
 <c:chartSpace xmlns:c="http://schemas.openxmlformats.org/drawingml/2006/chart" xmlns:a="http://schemas.openxmlformats.org/drawingml/2006/main" xmlns:r="http://schemas.openxmlformats.org/officeDocument/2006/relationships" xmlns:c16r2="http://schemas.microsoft.com/office/drawing/2015/06/chart">
   <c:date1904 val="0"/>
   <c:lang val="en-US"/>
@@ -2181,7 +2574,7 @@
           <a:p>
             <a:fld id="{268042A1-6D91-4513-A62D-1E3FD70C84BE}" type="datetimeFigureOut">
               <a:rPr lang="fr-FR" smtClean="0"/>
-              <a:t>03/08/2020</a:t>
+              <a:t>25/10/2021</a:t>
             </a:fld>
             <a:endParaRPr lang="fr-FR"/>
           </a:p>
@@ -2779,7 +3172,7 @@
             <a:fld id="{D8E3BBD6-5DF7-411E-B793-6A3558CCCDCA}" type="datetimeFigureOut">
               <a:rPr lang="fr-FR" smtClean="0"/>
               <a:pPr/>
-              <a:t>03/08/2020</a:t>
+              <a:t>25/10/2021</a:t>
             </a:fld>
             <a:endParaRPr lang="fr-FR" dirty="0"/>
           </a:p>
@@ -2942,7 +3335,7 @@
             <a:fld id="{D8E3BBD6-5DF7-411E-B793-6A3558CCCDCA}" type="datetimeFigureOut">
               <a:rPr lang="fr-FR" smtClean="0"/>
               <a:pPr/>
-              <a:t>03/08/2020</a:t>
+              <a:t>25/10/2021</a:t>
             </a:fld>
             <a:endParaRPr lang="fr-FR" dirty="0"/>
           </a:p>
@@ -4447,7 +4840,7 @@
             <a:fld id="{D8E3BBD6-5DF7-411E-B793-6A3558CCCDCA}" type="datetimeFigureOut">
               <a:rPr lang="fr-FR" smtClean="0"/>
               <a:pPr/>
-              <a:t>03/08/2020</a:t>
+              <a:t>25/10/2021</a:t>
             </a:fld>
             <a:endParaRPr lang="fr-FR" dirty="0"/>
           </a:p>
@@ -6807,7 +7200,7 @@
             <a:fld id="{D8E3BBD6-5DF7-411E-B793-6A3558CCCDCA}" type="datetimeFigureOut">
               <a:rPr lang="fr-FR" smtClean="0"/>
               <a:pPr/>
-              <a:t>03/08/2020</a:t>
+              <a:t>25/10/2021</a:t>
             </a:fld>
             <a:endParaRPr lang="fr-FR" dirty="0"/>
           </a:p>
@@ -9433,7 +9826,7 @@
             <a:fld id="{D8E3BBD6-5DF7-411E-B793-6A3558CCCDCA}" type="datetimeFigureOut">
               <a:rPr lang="fr-FR" smtClean="0"/>
               <a:pPr/>
-              <a:t>03/08/2020</a:t>
+              <a:t>25/10/2021</a:t>
             </a:fld>
             <a:endParaRPr lang="fr-FR" dirty="0"/>
           </a:p>
@@ -12342,7 +12735,7 @@
             <a:fld id="{D8E3BBD6-5DF7-411E-B793-6A3558CCCDCA}" type="datetimeFigureOut">
               <a:rPr lang="fr-FR" smtClean="0"/>
               <a:pPr/>
-              <a:t>03/08/2020</a:t>
+              <a:t>25/10/2021</a:t>
             </a:fld>
             <a:endParaRPr lang="fr-FR" dirty="0"/>
           </a:p>
@@ -14126,7 +14519,7 @@
             <a:fld id="{D8E3BBD6-5DF7-411E-B793-6A3558CCCDCA}" type="datetimeFigureOut">
               <a:rPr lang="fr-FR" smtClean="0"/>
               <a:pPr/>
-              <a:t>03/08/2020</a:t>
+              <a:t>25/10/2021</a:t>
             </a:fld>
             <a:endParaRPr lang="fr-FR" dirty="0"/>
           </a:p>
@@ -14206,7 +14599,7 @@
             <a:fld id="{D8E3BBD6-5DF7-411E-B793-6A3558CCCDCA}" type="datetimeFigureOut">
               <a:rPr lang="fr-FR" smtClean="0"/>
               <a:pPr/>
-              <a:t>03/08/2020</a:t>
+              <a:t>25/10/2021</a:t>
             </a:fld>
             <a:endParaRPr lang="fr-FR" dirty="0"/>
           </a:p>
@@ -14466,7 +14859,7 @@
             <a:fld id="{D8E3BBD6-5DF7-411E-B793-6A3558CCCDCA}" type="datetimeFigureOut">
               <a:rPr lang="fr-FR" smtClean="0"/>
               <a:pPr/>
-              <a:t>03/08/2020</a:t>
+              <a:t>25/10/2021</a:t>
             </a:fld>
             <a:endParaRPr lang="fr-FR" dirty="0"/>
           </a:p>
@@ -14708,7 +15101,7 @@
             <a:fld id="{D8E3BBD6-5DF7-411E-B793-6A3558CCCDCA}" type="datetimeFigureOut">
               <a:rPr lang="fr-FR" smtClean="0"/>
               <a:pPr/>
-              <a:t>03/08/2020</a:t>
+              <a:t>25/10/2021</a:t>
             </a:fld>
             <a:endParaRPr lang="fr-FR" dirty="0"/>
           </a:p>
@@ -14910,7 +15303,7 @@
             <a:fld id="{D8E3BBD6-5DF7-411E-B793-6A3558CCCDCA}" type="datetimeFigureOut">
               <a:rPr lang="fr-FR" smtClean="0"/>
               <a:pPr/>
-              <a:t>03/08/2020</a:t>
+              <a:t>25/10/2021</a:t>
             </a:fld>
             <a:endParaRPr lang="fr-FR" dirty="0"/>
           </a:p>
@@ -20661,8 +21054,8 @@
         </p:nvSpPr>
         <p:spPr>
           <a:xfrm>
-            <a:off x="1115616" y="899428"/>
-            <a:ext cx="4314002" cy="369332"/>
+            <a:off x="1043608" y="908720"/>
+            <a:ext cx="7128792" cy="369332"/>
           </a:xfrm>
           <a:prstGeom prst="rect">
             <a:avLst/>
@@ -20691,7 +21084,15 @@
           <a:p>
             <a:r>
               <a:rPr lang="en-US" sz="1800" dirty="0"/>
-              <a:t>Technical Debt ratio per AFP</a:t>
+              <a:t>Technical Debt ratio per AFP – </a:t>
+            </a:r>
+            <a:r>
+              <a:rPr lang="en-US" sz="1800" dirty="0">
+                <a:solidFill>
+                  <a:srgbClr val="FF0000"/>
+                </a:solidFill>
+              </a:rPr>
+              <a:t>deprecated (old Cast formula)</a:t>
             </a:r>
           </a:p>
         </p:txBody>
@@ -21060,8 +21461,8 @@
         </p:nvSpPr>
         <p:spPr>
           <a:xfrm>
-            <a:off x="1115616" y="2843645"/>
-            <a:ext cx="4314002" cy="369332"/>
+            <a:off x="1043608" y="2843645"/>
+            <a:ext cx="7056784" cy="369332"/>
           </a:xfrm>
           <a:prstGeom prst="rect">
             <a:avLst/>
@@ -21090,8 +21491,17 @@
           <a:p>
             <a:r>
               <a:rPr lang="en-US" sz="1800" dirty="0"/>
-              <a:t>Technical Debt ratio per LOC</a:t>
-            </a:r>
+              <a:t>Technical Debt ratio per LOC - </a:t>
+            </a:r>
+            <a:r>
+              <a:rPr lang="en-US" sz="1800" dirty="0">
+                <a:solidFill>
+                  <a:srgbClr val="FF0000"/>
+                </a:solidFill>
+              </a:rPr>
+              <a:t>deprecated (old Cast formula)</a:t>
+            </a:r>
+            <a:endParaRPr lang="en-US" sz="1800" dirty="0"/>
           </a:p>
         </p:txBody>
       </p:sp>
@@ -21913,6 +22323,1140 @@
         </p:nvSpPr>
         <p:spPr>
           <a:xfrm>
+            <a:off x="1187624" y="692696"/>
+            <a:ext cx="6624736" cy="2440435"/>
+          </a:xfrm>
+          <a:prstGeom prst="roundRect">
+            <a:avLst>
+              <a:gd name="adj" fmla="val 4881"/>
+            </a:avLst>
+          </a:prstGeom>
+          <a:solidFill>
+            <a:schemeClr val="bg1">
+              <a:lumMod val="95000"/>
+            </a:schemeClr>
+          </a:solidFill>
+          <a:ln>
+            <a:noFill/>
+          </a:ln>
+          <a:effectLst/>
+        </p:spPr>
+        <p:style>
+          <a:lnRef idx="1">
+            <a:schemeClr val="accent5"/>
+          </a:lnRef>
+          <a:fillRef idx="3">
+            <a:schemeClr val="accent5"/>
+          </a:fillRef>
+          <a:effectRef idx="2">
+            <a:schemeClr val="accent5"/>
+          </a:effectRef>
+          <a:fontRef idx="minor">
+            <a:schemeClr val="lt1"/>
+          </a:fontRef>
+        </p:style>
+        <p:txBody>
+          <a:bodyPr rtlCol="0" anchor="ctr"/>
+          <a:lstStyle/>
+          <a:p>
+            <a:pPr algn="ctr"/>
+            <a:endParaRPr lang="en-US" dirty="0">
+              <a:solidFill>
+                <a:schemeClr val="lt1"/>
+              </a:solidFill>
+            </a:endParaRPr>
+          </a:p>
+        </p:txBody>
+      </p:sp>
+      <p:sp>
+        <p:nvSpPr>
+          <p:cNvPr id="7" name="TextBox 6"/>
+          <p:cNvSpPr txBox="1"/>
+          <p:nvPr/>
+        </p:nvSpPr>
+        <p:spPr>
+          <a:xfrm>
+            <a:off x="1115616" y="752476"/>
+            <a:ext cx="6480720" cy="369332"/>
+          </a:xfrm>
+          <a:prstGeom prst="rect">
+            <a:avLst/>
+          </a:prstGeom>
+          <a:noFill/>
+        </p:spPr>
+        <p:txBody>
+          <a:bodyPr wrap="square" lIns="180000" rIns="180000" rtlCol="0">
+            <a:spAutoFit/>
+          </a:bodyPr>
+          <a:lstStyle>
+            <a:defPPr>
+              <a:defRPr lang="fr-FR"/>
+            </a:defPPr>
+            <a:lvl1pPr>
+              <a:defRPr sz="2000" b="1">
+                <a:solidFill>
+                  <a:schemeClr val="tx1">
+                    <a:lumMod val="75000"/>
+                    <a:lumOff val="25000"/>
+                  </a:schemeClr>
+                </a:solidFill>
+              </a:defRPr>
+            </a:lvl1pPr>
+          </a:lstStyle>
+          <a:p>
+            <a:r>
+              <a:rPr lang="en-US" sz="1800" dirty="0"/>
+              <a:t>OMG Technical Debt ratio per AFP</a:t>
+            </a:r>
+            <a:endParaRPr lang="en-US" sz="1800" dirty="0">
+              <a:solidFill>
+                <a:srgbClr val="FF0000"/>
+              </a:solidFill>
+            </a:endParaRPr>
+          </a:p>
+        </p:txBody>
+      </p:sp>
+      <p:sp>
+        <p:nvSpPr>
+          <p:cNvPr id="8" name="TextBox 7"/>
+          <p:cNvSpPr txBox="1"/>
+          <p:nvPr/>
+        </p:nvSpPr>
+        <p:spPr>
+          <a:xfrm>
+            <a:off x="2771800" y="1571860"/>
+            <a:ext cx="4097978" cy="338554"/>
+          </a:xfrm>
+          <a:prstGeom prst="rect">
+            <a:avLst/>
+          </a:prstGeom>
+          <a:noFill/>
+        </p:spPr>
+        <p:txBody>
+          <a:bodyPr wrap="square" rtlCol="0">
+            <a:spAutoFit/>
+          </a:bodyPr>
+          <a:lstStyle>
+            <a:defPPr>
+              <a:defRPr lang="fr-FR"/>
+            </a:defPPr>
+            <a:lvl1pPr>
+              <a:defRPr sz="2000" b="1">
+                <a:solidFill>
+                  <a:srgbClr val="5E5E5E"/>
+                </a:solidFill>
+              </a:defRPr>
+            </a:lvl1pPr>
+          </a:lstStyle>
+          <a:p>
+            <a:r>
+              <a:rPr lang="en-US" sz="1600" dirty="0"/>
+              <a:t>PF_OMG_TECHDEBT_VS_AFP</a:t>
+            </a:r>
+          </a:p>
+        </p:txBody>
+      </p:sp>
+      <p:sp>
+        <p:nvSpPr>
+          <p:cNvPr id="9" name="TextBox 8"/>
+          <p:cNvSpPr txBox="1"/>
+          <p:nvPr/>
+        </p:nvSpPr>
+        <p:spPr>
+          <a:xfrm>
+            <a:off x="2300183" y="2368590"/>
+            <a:ext cx="436338" cy="400110"/>
+          </a:xfrm>
+          <a:prstGeom prst="rect">
+            <a:avLst/>
+          </a:prstGeom>
+          <a:noFill/>
+        </p:spPr>
+        <p:txBody>
+          <a:bodyPr wrap="square" rtlCol="0">
+            <a:normAutofit/>
+          </a:bodyPr>
+          <a:lstStyle>
+            <a:defPPr>
+              <a:defRPr lang="fr-FR"/>
+            </a:defPPr>
+            <a:lvl1pPr>
+              <a:defRPr sz="2000" b="1">
+                <a:solidFill>
+                  <a:schemeClr val="bg1">
+                    <a:lumMod val="50000"/>
+                  </a:schemeClr>
+                </a:solidFill>
+              </a:defRPr>
+            </a:lvl1pPr>
+          </a:lstStyle>
+          <a:p>
+            <a:r>
+              <a:rPr lang="en-US" dirty="0">
+                <a:sym typeface="Wingdings" pitchFamily="2" charset="2"/>
+              </a:rPr>
+              <a:t></a:t>
+            </a:r>
+            <a:endParaRPr lang="en-US" dirty="0"/>
+          </a:p>
+        </p:txBody>
+      </p:sp>
+      <p:sp>
+        <p:nvSpPr>
+          <p:cNvPr id="10" name="TextBox 9"/>
+          <p:cNvSpPr txBox="1"/>
+          <p:nvPr/>
+        </p:nvSpPr>
+        <p:spPr>
+          <a:xfrm>
+            <a:off x="1214964" y="1535272"/>
+            <a:ext cx="1556836" cy="369332"/>
+          </a:xfrm>
+          <a:prstGeom prst="rect">
+            <a:avLst/>
+          </a:prstGeom>
+          <a:noFill/>
+        </p:spPr>
+        <p:txBody>
+          <a:bodyPr wrap="none" rtlCol="0">
+            <a:spAutoFit/>
+          </a:bodyPr>
+          <a:lstStyle>
+            <a:defPPr>
+              <a:defRPr lang="fr-FR"/>
+            </a:defPPr>
+            <a:lvl1pPr algn="r">
+              <a:defRPr sz="2000">
+                <a:solidFill>
+                  <a:schemeClr val="bg1">
+                    <a:lumMod val="50000"/>
+                  </a:schemeClr>
+                </a:solidFill>
+              </a:defRPr>
+            </a:lvl1pPr>
+          </a:lstStyle>
+          <a:p>
+            <a:r>
+              <a:rPr lang="en-US" sz="1800" dirty="0"/>
+              <a:t>Block Name :</a:t>
+            </a:r>
+          </a:p>
+        </p:txBody>
+      </p:sp>
+      <p:sp>
+        <p:nvSpPr>
+          <p:cNvPr id="11" name="TextBox 10"/>
+          <p:cNvSpPr txBox="1"/>
+          <p:nvPr/>
+        </p:nvSpPr>
+        <p:spPr>
+          <a:xfrm>
+            <a:off x="2736521" y="1926090"/>
+            <a:ext cx="5003831" cy="338554"/>
+          </a:xfrm>
+          <a:prstGeom prst="rect">
+            <a:avLst/>
+          </a:prstGeom>
+          <a:noFill/>
+        </p:spPr>
+        <p:txBody>
+          <a:bodyPr wrap="square" rtlCol="0">
+            <a:spAutoFit/>
+          </a:bodyPr>
+          <a:lstStyle>
+            <a:defPPr>
+              <a:defRPr lang="fr-FR"/>
+            </a:defPPr>
+            <a:lvl1pPr>
+              <a:defRPr sz="2000" i="1">
+                <a:solidFill>
+                  <a:schemeClr val="bg1">
+                    <a:lumMod val="50000"/>
+                  </a:schemeClr>
+                </a:solidFill>
+              </a:defRPr>
+            </a:lvl1pPr>
+          </a:lstStyle>
+          <a:p>
+            <a:r>
+              <a:rPr lang="en-US" sz="1600" dirty="0"/>
+              <a:t>ID=ISO or AIP or CISQ (ISO by default if not present)</a:t>
+            </a:r>
+          </a:p>
+        </p:txBody>
+      </p:sp>
+      <p:sp>
+        <p:nvSpPr>
+          <p:cNvPr id="12" name="TextBox 11"/>
+          <p:cNvSpPr txBox="1"/>
+          <p:nvPr/>
+        </p:nvSpPr>
+        <p:spPr>
+          <a:xfrm>
+            <a:off x="1663804" y="1895312"/>
+            <a:ext cx="1107996" cy="369332"/>
+          </a:xfrm>
+          <a:prstGeom prst="rect">
+            <a:avLst/>
+          </a:prstGeom>
+          <a:noFill/>
+        </p:spPr>
+        <p:txBody>
+          <a:bodyPr wrap="none" rtlCol="0">
+            <a:spAutoFit/>
+          </a:bodyPr>
+          <a:lstStyle>
+            <a:defPPr>
+              <a:defRPr lang="fr-FR"/>
+            </a:defPPr>
+            <a:lvl1pPr algn="r">
+              <a:defRPr sz="2000">
+                <a:solidFill>
+                  <a:schemeClr val="bg1">
+                    <a:lumMod val="50000"/>
+                  </a:schemeClr>
+                </a:solidFill>
+              </a:defRPr>
+            </a:lvl1pPr>
+          </a:lstStyle>
+          <a:p>
+            <a:r>
+              <a:rPr lang="en-US" sz="1800" dirty="0"/>
+              <a:t>Options :</a:t>
+            </a:r>
+          </a:p>
+        </p:txBody>
+      </p:sp>
+      <p:sp>
+        <p:nvSpPr>
+          <p:cNvPr id="13" name="Rounded Rectangle 12"/>
+          <p:cNvSpPr/>
+          <p:nvPr/>
+        </p:nvSpPr>
+        <p:spPr>
+          <a:xfrm>
+            <a:off x="2809636" y="2374751"/>
+            <a:ext cx="3634572" cy="393949"/>
+          </a:xfrm>
+          <a:prstGeom prst="roundRect">
+            <a:avLst>
+              <a:gd name="adj" fmla="val 4881"/>
+            </a:avLst>
+          </a:prstGeom>
+          <a:solidFill>
+            <a:schemeClr val="bg1">
+              <a:lumMod val="75000"/>
+              <a:alpha val="45000"/>
+            </a:schemeClr>
+          </a:solidFill>
+          <a:ln>
+            <a:noFill/>
+          </a:ln>
+          <a:effectLst/>
+        </p:spPr>
+        <p:style>
+          <a:lnRef idx="1">
+            <a:schemeClr val="accent5"/>
+          </a:lnRef>
+          <a:fillRef idx="3">
+            <a:schemeClr val="accent5"/>
+          </a:fillRef>
+          <a:effectRef idx="2">
+            <a:schemeClr val="accent5"/>
+          </a:effectRef>
+          <a:fontRef idx="minor">
+            <a:schemeClr val="lt1"/>
+          </a:fontRef>
+        </p:style>
+        <p:txBody>
+          <a:bodyPr rtlCol="0" anchor="ctr"/>
+          <a:lstStyle/>
+          <a:p>
+            <a:pPr algn="ctr"/>
+            <a:endParaRPr lang="en-US" dirty="0"/>
+          </a:p>
+        </p:txBody>
+      </p:sp>
+      <p:sp>
+        <p:nvSpPr>
+          <p:cNvPr id="14" name="TextBox 13" descr="TEXT;PF_OMG_TECHDEBT_VS_AFP"/>
+          <p:cNvSpPr txBox="1"/>
+          <p:nvPr/>
+        </p:nvSpPr>
+        <p:spPr>
+          <a:xfrm>
+            <a:off x="2816114" y="2368590"/>
+            <a:ext cx="3844118" cy="400110"/>
+          </a:xfrm>
+          <a:prstGeom prst="rect">
+            <a:avLst/>
+          </a:prstGeom>
+          <a:noFill/>
+        </p:spPr>
+        <p:txBody>
+          <a:bodyPr wrap="square" rtlCol="0">
+            <a:normAutofit/>
+          </a:bodyPr>
+          <a:lstStyle>
+            <a:defPPr>
+              <a:defRPr lang="fr-FR"/>
+            </a:defPPr>
+            <a:lvl1pPr>
+              <a:defRPr sz="2000" b="1">
+                <a:solidFill>
+                  <a:schemeClr val="bg1">
+                    <a:lumMod val="50000"/>
+                  </a:schemeClr>
+                </a:solidFill>
+              </a:defRPr>
+            </a:lvl1pPr>
+          </a:lstStyle>
+          <a:p>
+            <a:r>
+              <a:rPr lang="en-US" dirty="0"/>
+              <a:t>Value</a:t>
+            </a:r>
+          </a:p>
+        </p:txBody>
+      </p:sp>
+      <p:sp>
+        <p:nvSpPr>
+          <p:cNvPr id="32" name="TextBox 31">
+            <a:extLst>
+              <a:ext uri="{FF2B5EF4-FFF2-40B4-BE49-F238E27FC236}">
+                <a16:creationId xmlns:a16="http://schemas.microsoft.com/office/drawing/2014/main" id="{6F513568-9E52-4CC9-B774-3BC1271B3318}"/>
+              </a:ext>
+            </a:extLst>
+          </p:cNvPr>
+          <p:cNvSpPr txBox="1"/>
+          <p:nvPr/>
+        </p:nvSpPr>
+        <p:spPr>
+          <a:xfrm>
+            <a:off x="1214964" y="1206693"/>
+            <a:ext cx="6309364" cy="338554"/>
+          </a:xfrm>
+          <a:prstGeom prst="rect">
+            <a:avLst/>
+          </a:prstGeom>
+          <a:noFill/>
+        </p:spPr>
+        <p:txBody>
+          <a:bodyPr wrap="square" rtlCol="0">
+            <a:spAutoFit/>
+          </a:bodyPr>
+          <a:lstStyle>
+            <a:defPPr>
+              <a:defRPr lang="fr-FR"/>
+            </a:defPPr>
+            <a:lvl1pPr>
+              <a:defRPr sz="2000" i="1">
+                <a:solidFill>
+                  <a:schemeClr val="bg1">
+                    <a:lumMod val="50000"/>
+                  </a:schemeClr>
+                </a:solidFill>
+              </a:defRPr>
+            </a:lvl1pPr>
+          </a:lstStyle>
+          <a:p>
+            <a:r>
+              <a:rPr lang="en-US" sz="1600" dirty="0"/>
+              <a:t>Display the total of OMG technical debt per AFP in Days</a:t>
+            </a:r>
+          </a:p>
+        </p:txBody>
+      </p:sp>
+      <p:sp>
+        <p:nvSpPr>
+          <p:cNvPr id="33" name="Rounded Rectangle 5">
+            <a:extLst>
+              <a:ext uri="{FF2B5EF4-FFF2-40B4-BE49-F238E27FC236}">
+                <a16:creationId xmlns:a16="http://schemas.microsoft.com/office/drawing/2014/main" id="{AD38BFEB-9780-4939-A214-84C7DEB59D41}"/>
+              </a:ext>
+            </a:extLst>
+          </p:cNvPr>
+          <p:cNvSpPr/>
+          <p:nvPr/>
+        </p:nvSpPr>
+        <p:spPr>
+          <a:xfrm>
+            <a:off x="1187624" y="3212976"/>
+            <a:ext cx="6624736" cy="2440435"/>
+          </a:xfrm>
+          <a:prstGeom prst="roundRect">
+            <a:avLst>
+              <a:gd name="adj" fmla="val 4881"/>
+            </a:avLst>
+          </a:prstGeom>
+          <a:solidFill>
+            <a:schemeClr val="bg1">
+              <a:lumMod val="95000"/>
+            </a:schemeClr>
+          </a:solidFill>
+          <a:ln>
+            <a:noFill/>
+          </a:ln>
+          <a:effectLst/>
+        </p:spPr>
+        <p:style>
+          <a:lnRef idx="1">
+            <a:schemeClr val="accent5"/>
+          </a:lnRef>
+          <a:fillRef idx="3">
+            <a:schemeClr val="accent5"/>
+          </a:fillRef>
+          <a:effectRef idx="2">
+            <a:schemeClr val="accent5"/>
+          </a:effectRef>
+          <a:fontRef idx="minor">
+            <a:schemeClr val="lt1"/>
+          </a:fontRef>
+        </p:style>
+        <p:txBody>
+          <a:bodyPr rtlCol="0" anchor="ctr"/>
+          <a:lstStyle/>
+          <a:p>
+            <a:pPr algn="ctr"/>
+            <a:endParaRPr lang="en-US" dirty="0">
+              <a:solidFill>
+                <a:schemeClr val="lt1"/>
+              </a:solidFill>
+            </a:endParaRPr>
+          </a:p>
+        </p:txBody>
+      </p:sp>
+      <p:sp>
+        <p:nvSpPr>
+          <p:cNvPr id="34" name="TextBox 33">
+            <a:extLst>
+              <a:ext uri="{FF2B5EF4-FFF2-40B4-BE49-F238E27FC236}">
+                <a16:creationId xmlns:a16="http://schemas.microsoft.com/office/drawing/2014/main" id="{2C49E522-B5AA-46E5-9464-DCC6225870EF}"/>
+              </a:ext>
+            </a:extLst>
+          </p:cNvPr>
+          <p:cNvSpPr txBox="1"/>
+          <p:nvPr/>
+        </p:nvSpPr>
+        <p:spPr>
+          <a:xfrm>
+            <a:off x="1115616" y="3272756"/>
+            <a:ext cx="6480720" cy="369332"/>
+          </a:xfrm>
+          <a:prstGeom prst="rect">
+            <a:avLst/>
+          </a:prstGeom>
+          <a:noFill/>
+        </p:spPr>
+        <p:txBody>
+          <a:bodyPr wrap="square" lIns="180000" rIns="180000" rtlCol="0">
+            <a:spAutoFit/>
+          </a:bodyPr>
+          <a:lstStyle>
+            <a:defPPr>
+              <a:defRPr lang="fr-FR"/>
+            </a:defPPr>
+            <a:lvl1pPr>
+              <a:defRPr sz="2000" b="1">
+                <a:solidFill>
+                  <a:schemeClr val="tx1">
+                    <a:lumMod val="75000"/>
+                    <a:lumOff val="25000"/>
+                  </a:schemeClr>
+                </a:solidFill>
+              </a:defRPr>
+            </a:lvl1pPr>
+          </a:lstStyle>
+          <a:p>
+            <a:r>
+              <a:rPr lang="en-US" sz="1800" dirty="0"/>
+              <a:t>OMG Technical Debt ratio per KLOC</a:t>
+            </a:r>
+            <a:endParaRPr lang="en-US" sz="1800" dirty="0">
+              <a:solidFill>
+                <a:srgbClr val="FF0000"/>
+              </a:solidFill>
+            </a:endParaRPr>
+          </a:p>
+        </p:txBody>
+      </p:sp>
+      <p:sp>
+        <p:nvSpPr>
+          <p:cNvPr id="35" name="TextBox 34">
+            <a:extLst>
+              <a:ext uri="{FF2B5EF4-FFF2-40B4-BE49-F238E27FC236}">
+                <a16:creationId xmlns:a16="http://schemas.microsoft.com/office/drawing/2014/main" id="{189C6CEE-13CB-4241-98F5-0E27286AC29D}"/>
+              </a:ext>
+            </a:extLst>
+          </p:cNvPr>
+          <p:cNvSpPr txBox="1"/>
+          <p:nvPr/>
+        </p:nvSpPr>
+        <p:spPr>
+          <a:xfrm>
+            <a:off x="2771800" y="4092140"/>
+            <a:ext cx="4097978" cy="338554"/>
+          </a:xfrm>
+          <a:prstGeom prst="rect">
+            <a:avLst/>
+          </a:prstGeom>
+          <a:noFill/>
+        </p:spPr>
+        <p:txBody>
+          <a:bodyPr wrap="square" rtlCol="0">
+            <a:spAutoFit/>
+          </a:bodyPr>
+          <a:lstStyle>
+            <a:defPPr>
+              <a:defRPr lang="fr-FR"/>
+            </a:defPPr>
+            <a:lvl1pPr>
+              <a:defRPr sz="2000" b="1">
+                <a:solidFill>
+                  <a:srgbClr val="5E5E5E"/>
+                </a:solidFill>
+              </a:defRPr>
+            </a:lvl1pPr>
+          </a:lstStyle>
+          <a:p>
+            <a:r>
+              <a:rPr lang="en-US" sz="1600" dirty="0"/>
+              <a:t>PF_OMG_TECHDEBT_VS_KLOC</a:t>
+            </a:r>
+          </a:p>
+        </p:txBody>
+      </p:sp>
+      <p:sp>
+        <p:nvSpPr>
+          <p:cNvPr id="50" name="TextBox 49">
+            <a:extLst>
+              <a:ext uri="{FF2B5EF4-FFF2-40B4-BE49-F238E27FC236}">
+                <a16:creationId xmlns:a16="http://schemas.microsoft.com/office/drawing/2014/main" id="{70CE6EEC-DFFA-432E-9ECC-150F9BD1C65F}"/>
+              </a:ext>
+            </a:extLst>
+          </p:cNvPr>
+          <p:cNvSpPr txBox="1"/>
+          <p:nvPr/>
+        </p:nvSpPr>
+        <p:spPr>
+          <a:xfrm>
+            <a:off x="2300183" y="4888870"/>
+            <a:ext cx="436338" cy="400110"/>
+          </a:xfrm>
+          <a:prstGeom prst="rect">
+            <a:avLst/>
+          </a:prstGeom>
+          <a:noFill/>
+        </p:spPr>
+        <p:txBody>
+          <a:bodyPr wrap="square" rtlCol="0">
+            <a:normAutofit/>
+          </a:bodyPr>
+          <a:lstStyle>
+            <a:defPPr>
+              <a:defRPr lang="fr-FR"/>
+            </a:defPPr>
+            <a:lvl1pPr>
+              <a:defRPr sz="2000" b="1">
+                <a:solidFill>
+                  <a:schemeClr val="bg1">
+                    <a:lumMod val="50000"/>
+                  </a:schemeClr>
+                </a:solidFill>
+              </a:defRPr>
+            </a:lvl1pPr>
+          </a:lstStyle>
+          <a:p>
+            <a:r>
+              <a:rPr lang="en-US" dirty="0">
+                <a:sym typeface="Wingdings" pitchFamily="2" charset="2"/>
+              </a:rPr>
+              <a:t></a:t>
+            </a:r>
+            <a:endParaRPr lang="en-US" dirty="0"/>
+          </a:p>
+        </p:txBody>
+      </p:sp>
+      <p:sp>
+        <p:nvSpPr>
+          <p:cNvPr id="54" name="TextBox 53">
+            <a:extLst>
+              <a:ext uri="{FF2B5EF4-FFF2-40B4-BE49-F238E27FC236}">
+                <a16:creationId xmlns:a16="http://schemas.microsoft.com/office/drawing/2014/main" id="{41AED794-A256-4DC8-AB7D-7684E58BDBC9}"/>
+              </a:ext>
+            </a:extLst>
+          </p:cNvPr>
+          <p:cNvSpPr txBox="1"/>
+          <p:nvPr/>
+        </p:nvSpPr>
+        <p:spPr>
+          <a:xfrm>
+            <a:off x="1214964" y="4055552"/>
+            <a:ext cx="1556836" cy="369332"/>
+          </a:xfrm>
+          <a:prstGeom prst="rect">
+            <a:avLst/>
+          </a:prstGeom>
+          <a:noFill/>
+        </p:spPr>
+        <p:txBody>
+          <a:bodyPr wrap="none" rtlCol="0">
+            <a:spAutoFit/>
+          </a:bodyPr>
+          <a:lstStyle>
+            <a:defPPr>
+              <a:defRPr lang="fr-FR"/>
+            </a:defPPr>
+            <a:lvl1pPr algn="r">
+              <a:defRPr sz="2000">
+                <a:solidFill>
+                  <a:schemeClr val="bg1">
+                    <a:lumMod val="50000"/>
+                  </a:schemeClr>
+                </a:solidFill>
+              </a:defRPr>
+            </a:lvl1pPr>
+          </a:lstStyle>
+          <a:p>
+            <a:r>
+              <a:rPr lang="en-US" sz="1800" dirty="0"/>
+              <a:t>Block Name :</a:t>
+            </a:r>
+          </a:p>
+        </p:txBody>
+      </p:sp>
+      <p:sp>
+        <p:nvSpPr>
+          <p:cNvPr id="55" name="TextBox 54">
+            <a:extLst>
+              <a:ext uri="{FF2B5EF4-FFF2-40B4-BE49-F238E27FC236}">
+                <a16:creationId xmlns:a16="http://schemas.microsoft.com/office/drawing/2014/main" id="{708F8735-8D93-4FC2-8A0A-601035C008DA}"/>
+              </a:ext>
+            </a:extLst>
+          </p:cNvPr>
+          <p:cNvSpPr txBox="1"/>
+          <p:nvPr/>
+        </p:nvSpPr>
+        <p:spPr>
+          <a:xfrm>
+            <a:off x="2736521" y="4446370"/>
+            <a:ext cx="5003831" cy="338554"/>
+          </a:xfrm>
+          <a:prstGeom prst="rect">
+            <a:avLst/>
+          </a:prstGeom>
+          <a:noFill/>
+        </p:spPr>
+        <p:txBody>
+          <a:bodyPr wrap="square" rtlCol="0">
+            <a:spAutoFit/>
+          </a:bodyPr>
+          <a:lstStyle>
+            <a:defPPr>
+              <a:defRPr lang="fr-FR"/>
+            </a:defPPr>
+            <a:lvl1pPr>
+              <a:defRPr sz="2000" i="1">
+                <a:solidFill>
+                  <a:schemeClr val="bg1">
+                    <a:lumMod val="50000"/>
+                  </a:schemeClr>
+                </a:solidFill>
+              </a:defRPr>
+            </a:lvl1pPr>
+          </a:lstStyle>
+          <a:p>
+            <a:r>
+              <a:rPr lang="en-US" sz="1600" dirty="0"/>
+              <a:t>ID=ISO or AIP or CISQ (ISO by default if not present)</a:t>
+            </a:r>
+          </a:p>
+        </p:txBody>
+      </p:sp>
+      <p:sp>
+        <p:nvSpPr>
+          <p:cNvPr id="56" name="TextBox 55">
+            <a:extLst>
+              <a:ext uri="{FF2B5EF4-FFF2-40B4-BE49-F238E27FC236}">
+                <a16:creationId xmlns:a16="http://schemas.microsoft.com/office/drawing/2014/main" id="{210DD899-7512-4651-BF28-2115A6A83DB0}"/>
+              </a:ext>
+            </a:extLst>
+          </p:cNvPr>
+          <p:cNvSpPr txBox="1"/>
+          <p:nvPr/>
+        </p:nvSpPr>
+        <p:spPr>
+          <a:xfrm>
+            <a:off x="1663804" y="4415592"/>
+            <a:ext cx="1107996" cy="369332"/>
+          </a:xfrm>
+          <a:prstGeom prst="rect">
+            <a:avLst/>
+          </a:prstGeom>
+          <a:noFill/>
+        </p:spPr>
+        <p:txBody>
+          <a:bodyPr wrap="none" rtlCol="0">
+            <a:spAutoFit/>
+          </a:bodyPr>
+          <a:lstStyle>
+            <a:defPPr>
+              <a:defRPr lang="fr-FR"/>
+            </a:defPPr>
+            <a:lvl1pPr algn="r">
+              <a:defRPr sz="2000">
+                <a:solidFill>
+                  <a:schemeClr val="bg1">
+                    <a:lumMod val="50000"/>
+                  </a:schemeClr>
+                </a:solidFill>
+              </a:defRPr>
+            </a:lvl1pPr>
+          </a:lstStyle>
+          <a:p>
+            <a:r>
+              <a:rPr lang="en-US" sz="1800" dirty="0"/>
+              <a:t>Options :</a:t>
+            </a:r>
+          </a:p>
+        </p:txBody>
+      </p:sp>
+      <p:sp>
+        <p:nvSpPr>
+          <p:cNvPr id="57" name="Rounded Rectangle 12">
+            <a:extLst>
+              <a:ext uri="{FF2B5EF4-FFF2-40B4-BE49-F238E27FC236}">
+                <a16:creationId xmlns:a16="http://schemas.microsoft.com/office/drawing/2014/main" id="{BE229690-04E5-4C00-B0F5-E607FCBA2D46}"/>
+              </a:ext>
+            </a:extLst>
+          </p:cNvPr>
+          <p:cNvSpPr/>
+          <p:nvPr/>
+        </p:nvSpPr>
+        <p:spPr>
+          <a:xfrm>
+            <a:off x="2809636" y="4895031"/>
+            <a:ext cx="3634572" cy="393949"/>
+          </a:xfrm>
+          <a:prstGeom prst="roundRect">
+            <a:avLst>
+              <a:gd name="adj" fmla="val 4881"/>
+            </a:avLst>
+          </a:prstGeom>
+          <a:solidFill>
+            <a:schemeClr val="bg1">
+              <a:lumMod val="75000"/>
+              <a:alpha val="45000"/>
+            </a:schemeClr>
+          </a:solidFill>
+          <a:ln>
+            <a:noFill/>
+          </a:ln>
+          <a:effectLst/>
+        </p:spPr>
+        <p:style>
+          <a:lnRef idx="1">
+            <a:schemeClr val="accent5"/>
+          </a:lnRef>
+          <a:fillRef idx="3">
+            <a:schemeClr val="accent5"/>
+          </a:fillRef>
+          <a:effectRef idx="2">
+            <a:schemeClr val="accent5"/>
+          </a:effectRef>
+          <a:fontRef idx="minor">
+            <a:schemeClr val="lt1"/>
+          </a:fontRef>
+        </p:style>
+        <p:txBody>
+          <a:bodyPr rtlCol="0" anchor="ctr"/>
+          <a:lstStyle/>
+          <a:p>
+            <a:pPr algn="ctr"/>
+            <a:endParaRPr lang="en-US" dirty="0"/>
+          </a:p>
+        </p:txBody>
+      </p:sp>
+      <p:sp>
+        <p:nvSpPr>
+          <p:cNvPr id="58" name="TextBox 57" descr="TEXT;PF_OMG_TECHDEBT_VS_KLOC">
+            <a:extLst>
+              <a:ext uri="{FF2B5EF4-FFF2-40B4-BE49-F238E27FC236}">
+                <a16:creationId xmlns:a16="http://schemas.microsoft.com/office/drawing/2014/main" id="{DF747808-DA72-4A7E-82E4-0F7DE9E87AC6}"/>
+              </a:ext>
+            </a:extLst>
+          </p:cNvPr>
+          <p:cNvSpPr txBox="1"/>
+          <p:nvPr/>
+        </p:nvSpPr>
+        <p:spPr>
+          <a:xfrm>
+            <a:off x="2816114" y="4888870"/>
+            <a:ext cx="3844118" cy="400110"/>
+          </a:xfrm>
+          <a:prstGeom prst="rect">
+            <a:avLst/>
+          </a:prstGeom>
+          <a:noFill/>
+        </p:spPr>
+        <p:txBody>
+          <a:bodyPr wrap="square" rtlCol="0">
+            <a:normAutofit/>
+          </a:bodyPr>
+          <a:lstStyle>
+            <a:defPPr>
+              <a:defRPr lang="fr-FR"/>
+            </a:defPPr>
+            <a:lvl1pPr>
+              <a:defRPr sz="2000" b="1">
+                <a:solidFill>
+                  <a:schemeClr val="bg1">
+                    <a:lumMod val="50000"/>
+                  </a:schemeClr>
+                </a:solidFill>
+              </a:defRPr>
+            </a:lvl1pPr>
+          </a:lstStyle>
+          <a:p>
+            <a:r>
+              <a:rPr lang="en-US" dirty="0"/>
+              <a:t>Value</a:t>
+            </a:r>
+          </a:p>
+        </p:txBody>
+      </p:sp>
+      <p:sp>
+        <p:nvSpPr>
+          <p:cNvPr id="59" name="TextBox 58">
+            <a:extLst>
+              <a:ext uri="{FF2B5EF4-FFF2-40B4-BE49-F238E27FC236}">
+                <a16:creationId xmlns:a16="http://schemas.microsoft.com/office/drawing/2014/main" id="{DBCF2D9C-D251-40BF-B222-5C23044B2121}"/>
+              </a:ext>
+            </a:extLst>
+          </p:cNvPr>
+          <p:cNvSpPr txBox="1"/>
+          <p:nvPr/>
+        </p:nvSpPr>
+        <p:spPr>
+          <a:xfrm>
+            <a:off x="1214964" y="3726973"/>
+            <a:ext cx="6309364" cy="338554"/>
+          </a:xfrm>
+          <a:prstGeom prst="rect">
+            <a:avLst/>
+          </a:prstGeom>
+          <a:noFill/>
+        </p:spPr>
+        <p:txBody>
+          <a:bodyPr wrap="square" rtlCol="0">
+            <a:spAutoFit/>
+          </a:bodyPr>
+          <a:lstStyle>
+            <a:defPPr>
+              <a:defRPr lang="fr-FR"/>
+            </a:defPPr>
+            <a:lvl1pPr>
+              <a:defRPr sz="2000" i="1">
+                <a:solidFill>
+                  <a:schemeClr val="bg1">
+                    <a:lumMod val="50000"/>
+                  </a:schemeClr>
+                </a:solidFill>
+              </a:defRPr>
+            </a:lvl1pPr>
+          </a:lstStyle>
+          <a:p>
+            <a:r>
+              <a:rPr lang="en-US" sz="1600" dirty="0"/>
+              <a:t>Display the total of OMG technical debt per KLOC in Days</a:t>
+            </a:r>
+          </a:p>
+        </p:txBody>
+      </p:sp>
+      <p:sp>
+        <p:nvSpPr>
+          <p:cNvPr id="60" name="TextBox 59">
+            <a:extLst>
+              <a:ext uri="{FF2B5EF4-FFF2-40B4-BE49-F238E27FC236}">
+                <a16:creationId xmlns:a16="http://schemas.microsoft.com/office/drawing/2014/main" id="{4DC95090-0738-4C4D-A8D6-F0ECB1E76E4D}"/>
+              </a:ext>
+            </a:extLst>
+          </p:cNvPr>
+          <p:cNvSpPr txBox="1"/>
+          <p:nvPr/>
+        </p:nvSpPr>
+        <p:spPr>
+          <a:xfrm>
+            <a:off x="139131" y="5733256"/>
+            <a:ext cx="8661833" cy="798748"/>
+          </a:xfrm>
+          <a:prstGeom prst="rect">
+            <a:avLst/>
+          </a:prstGeom>
+        </p:spPr>
+        <p:txBody>
+          <a:bodyPr vert="horz" wrap="square" lIns="91440" tIns="45720" rIns="91440" bIns="45720" rtlCol="0" anchor="t">
+            <a:noAutofit/>
+          </a:bodyPr>
+          <a:lstStyle/>
+          <a:p>
+            <a:pPr marL="285750" indent="-285750">
+              <a:buFont typeface="Arial" panose="020B0604020202020204" pitchFamily="34" charset="0"/>
+              <a:buChar char="•"/>
+            </a:pPr>
+            <a:r>
+              <a:rPr lang="en-US" sz="1100" dirty="0">
+                <a:solidFill>
+                  <a:srgbClr val="0070C0"/>
+                </a:solidFill>
+              </a:rPr>
+              <a:t>ISO option is the recommended technical debt to be used. Requires installation of OMG Technical Debt Measure (&gt;2.0.0 </a:t>
+            </a:r>
+            <a:r>
+              <a:rPr lang="en-US" sz="1100" dirty="0" err="1">
+                <a:solidFill>
+                  <a:srgbClr val="0070C0"/>
+                </a:solidFill>
+              </a:rPr>
+              <a:t>funcrel</a:t>
+            </a:r>
+            <a:r>
+              <a:rPr lang="en-US" sz="1100" dirty="0">
+                <a:solidFill>
+                  <a:srgbClr val="0070C0"/>
+                </a:solidFill>
+              </a:rPr>
+              <a:t>) and ISO-5055 Index extensions during analysis</a:t>
+            </a:r>
+          </a:p>
+          <a:p>
+            <a:pPr marL="285750" indent="-285750">
+              <a:buFont typeface="Arial" panose="020B0604020202020204" pitchFamily="34" charset="0"/>
+              <a:buChar char="•"/>
+            </a:pPr>
+            <a:r>
+              <a:rPr lang="en-US" sz="1100" dirty="0">
+                <a:solidFill>
+                  <a:srgbClr val="0070C0"/>
+                </a:solidFill>
+              </a:rPr>
+              <a:t>CISQ option required installation of OMG Technical Debt Measure and CISQ Index extensions during analysis. Scope of rules is reduced</a:t>
+            </a:r>
+          </a:p>
+        </p:txBody>
+      </p:sp>
+    </p:spTree>
+    <p:extLst>
+      <p:ext uri="{BB962C8B-B14F-4D97-AF65-F5344CB8AC3E}">
+        <p14:creationId xmlns:p14="http://schemas.microsoft.com/office/powerpoint/2010/main" val="324327082"/>
+      </p:ext>
+    </p:extLst>
+  </p:cSld>
+  <p:clrMapOvr>
+    <a:masterClrMapping/>
+  </p:clrMapOvr>
+</p:sld>
+</file>
+
+<file path=ppt/slides/slide13.xml><?xml version="1.0" encoding="utf-8"?>
+<p:sld xmlns:a="http://schemas.openxmlformats.org/drawingml/2006/main" xmlns:r="http://schemas.openxmlformats.org/officeDocument/2006/relationships" xmlns:p="http://schemas.openxmlformats.org/presentationml/2006/main">
+  <p:cSld>
+    <p:spTree>
+      <p:nvGrpSpPr>
+        <p:cNvPr id="1" name=""/>
+        <p:cNvGrpSpPr/>
+        <p:nvPr/>
+      </p:nvGrpSpPr>
+      <p:grpSpPr>
+        <a:xfrm>
+          <a:off x="0" y="0"/>
+          <a:ext cx="0" cy="0"/>
+          <a:chOff x="0" y="0"/>
+          <a:chExt cx="0" cy="0"/>
+        </a:xfrm>
+      </p:grpSpPr>
+      <p:sp>
+        <p:nvSpPr>
+          <p:cNvPr id="2" name="Slide Number Placeholder 1"/>
+          <p:cNvSpPr>
+            <a:spLocks noGrp="1"/>
+          </p:cNvSpPr>
+          <p:nvPr>
+            <p:ph type="sldNum" sz="quarter" idx="10"/>
+          </p:nvPr>
+        </p:nvSpPr>
+        <p:spPr/>
+        <p:txBody>
+          <a:bodyPr/>
+          <a:lstStyle/>
+          <a:p>
+            <a:pPr>
+              <a:buClr>
+                <a:prstClr val="black"/>
+              </a:buClr>
+            </a:pPr>
+            <a:fld id="{F71C7896-8E11-4384-BFC5-C0974CDBC83D}" type="slidenum">
+              <a:rPr lang="en-US" smtClean="0">
+                <a:solidFill>
+                  <a:srgbClr val="000000">
+                    <a:lumMod val="65000"/>
+                    <a:lumOff val="35000"/>
+                  </a:srgbClr>
+                </a:solidFill>
+              </a:rPr>
+              <a:pPr>
+                <a:buClr>
+                  <a:prstClr val="black"/>
+                </a:buClr>
+              </a:pPr>
+              <a:t>13</a:t>
+            </a:fld>
+            <a:endParaRPr lang="en-US" dirty="0">
+              <a:solidFill>
+                <a:srgbClr val="000000">
+                  <a:lumMod val="65000"/>
+                  <a:lumOff val="35000"/>
+                </a:srgbClr>
+              </a:solidFill>
+            </a:endParaRPr>
+          </a:p>
+        </p:txBody>
+      </p:sp>
+      <p:sp>
+        <p:nvSpPr>
+          <p:cNvPr id="5" name="Title 1"/>
+          <p:cNvSpPr>
+            <a:spLocks noGrp="1"/>
+          </p:cNvSpPr>
+          <p:nvPr>
+            <p:ph type="title"/>
+          </p:nvPr>
+        </p:nvSpPr>
+        <p:spPr>
+          <a:xfrm>
+            <a:off x="320040" y="237738"/>
+            <a:ext cx="8503920" cy="378565"/>
+          </a:xfrm>
+        </p:spPr>
+        <p:txBody>
+          <a:bodyPr/>
+          <a:lstStyle/>
+          <a:p>
+            <a:r>
+              <a:rPr lang="en-US" dirty="0"/>
+              <a:t>PowerPoint Templates – Text</a:t>
+            </a:r>
+          </a:p>
+        </p:txBody>
+      </p:sp>
+      <p:sp>
+        <p:nvSpPr>
+          <p:cNvPr id="6" name="Rounded Rectangle 5"/>
+          <p:cNvSpPr/>
+          <p:nvPr/>
+        </p:nvSpPr>
+        <p:spPr>
+          <a:xfrm>
             <a:off x="1187624" y="848940"/>
             <a:ext cx="6624736" cy="5172348"/>
           </a:xfrm>
@@ -22459,75 +24003,6 @@
 </p:sld>
 </file>
 
-<file path=ppt/slides/slide13.xml><?xml version="1.0" encoding="utf-8"?>
-<p:sld xmlns:a="http://schemas.openxmlformats.org/drawingml/2006/main" xmlns:r="http://schemas.openxmlformats.org/officeDocument/2006/relationships" xmlns:p="http://schemas.openxmlformats.org/presentationml/2006/main">
-  <p:cSld>
-    <p:spTree>
-      <p:nvGrpSpPr>
-        <p:cNvPr id="1" name=""/>
-        <p:cNvGrpSpPr/>
-        <p:nvPr/>
-      </p:nvGrpSpPr>
-      <p:grpSpPr>
-        <a:xfrm>
-          <a:off x="0" y="0"/>
-          <a:ext cx="0" cy="0"/>
-          <a:chOff x="0" y="0"/>
-          <a:chExt cx="0" cy="0"/>
-        </a:xfrm>
-      </p:grpSpPr>
-      <p:sp>
-        <p:nvSpPr>
-          <p:cNvPr id="11" name="Subtitle 10"/>
-          <p:cNvSpPr>
-            <a:spLocks noGrp="1"/>
-          </p:cNvSpPr>
-          <p:nvPr>
-            <p:ph type="subTitle" idx="1"/>
-          </p:nvPr>
-        </p:nvSpPr>
-        <p:spPr/>
-        <p:txBody>
-          <a:bodyPr/>
-          <a:lstStyle/>
-          <a:p>
-            <a:r>
-              <a:rPr lang="en-US" dirty="0"/>
-              <a:t>Graphic Templates</a:t>
-            </a:r>
-          </a:p>
-        </p:txBody>
-      </p:sp>
-      <p:sp>
-        <p:nvSpPr>
-          <p:cNvPr id="10" name="Title 9"/>
-          <p:cNvSpPr>
-            <a:spLocks noGrp="1"/>
-          </p:cNvSpPr>
-          <p:nvPr>
-            <p:ph type="ctrTitle" sz="quarter"/>
-          </p:nvPr>
-        </p:nvSpPr>
-        <p:spPr/>
-        <p:txBody>
-          <a:bodyPr/>
-          <a:lstStyle/>
-          <a:p>
-            <a:r>
-              <a:rPr lang="en-US" dirty="0"/>
-              <a:t>PowerPoint Templates</a:t>
-            </a:r>
-          </a:p>
-        </p:txBody>
-      </p:sp>
-    </p:spTree>
-  </p:cSld>
-  <p:clrMapOvr>
-    <a:masterClrMapping/>
-  </p:clrMapOvr>
-</p:sld>
-</file>
-
 <file path=ppt/slides/slide14.xml><?xml version="1.0" encoding="utf-8"?>
 <p:sld xmlns:a="http://schemas.openxmlformats.org/drawingml/2006/main" xmlns:r="http://schemas.openxmlformats.org/officeDocument/2006/relationships" xmlns:p="http://schemas.openxmlformats.org/presentationml/2006/main">
   <p:cSld>
@@ -22547,75 +24022,45 @@
       </p:grpSpPr>
       <p:sp>
         <p:nvSpPr>
-          <p:cNvPr id="2" name="Title 1"/>
+          <p:cNvPr id="11" name="Subtitle 10"/>
           <p:cNvSpPr>
             <a:spLocks noGrp="1"/>
           </p:cNvSpPr>
           <p:nvPr>
-            <p:ph type="title"/>
+            <p:ph type="subTitle" idx="1"/>
           </p:nvPr>
         </p:nvSpPr>
         <p:spPr/>
         <p:txBody>
-          <a:bodyPr>
-            <a:normAutofit/>
-          </a:bodyPr>
+          <a:bodyPr/>
           <a:lstStyle/>
           <a:p>
             <a:r>
-              <a:rPr lang="fr-FR" dirty="0"/>
-              <a:t>PowerPoint Templates – Graphics</a:t>
-            </a:r>
-          </a:p>
-        </p:txBody>
-      </p:sp>
-      <p:sp>
-        <p:nvSpPr>
-          <p:cNvPr id="78" name="Content Placeholder 77"/>
+              <a:rPr lang="en-US" dirty="0"/>
+              <a:t>Graphic Templates</a:t>
+            </a:r>
+          </a:p>
+        </p:txBody>
+      </p:sp>
+      <p:sp>
+        <p:nvSpPr>
+          <p:cNvPr id="10" name="Title 9"/>
           <p:cNvSpPr>
             <a:spLocks noGrp="1"/>
           </p:cNvSpPr>
           <p:nvPr>
-            <p:ph type="body" sz="quarter" idx="11"/>
+            <p:ph type="ctrTitle" sz="quarter"/>
           </p:nvPr>
         </p:nvSpPr>
-        <p:spPr>
-          <a:xfrm>
-            <a:off x="325438" y="907126"/>
-            <a:ext cx="8504237" cy="1749197"/>
-          </a:xfrm>
-        </p:spPr>
+        <p:spPr/>
         <p:txBody>
           <a:bodyPr/>
           <a:lstStyle/>
           <a:p>
             <a:r>
-              <a:rPr lang="fr-FR" sz="2400" dirty="0"/>
-              <a:t>This kind of template is identified by a type value as</a:t>
-            </a:r>
-            <a:br>
-              <a:rPr lang="fr-FR" sz="2400" dirty="0"/>
-            </a:br>
-            <a:r>
-              <a:rPr lang="fr-FR" sz="2400" dirty="0"/>
-              <a:t>			</a:t>
-            </a:r>
-          </a:p>
-          <a:p>
-            <a:pPr marL="0" indent="0">
-              <a:buNone/>
-            </a:pPr>
-            <a:r>
-              <a:rPr lang="fr-FR" sz="2400" dirty="0"/>
-              <a:t>			Type = </a:t>
-            </a:r>
-            <a:r>
-              <a:rPr lang="fr-FR" sz="2400" b="1" dirty="0"/>
-              <a:t>GRAPH</a:t>
-            </a:r>
-          </a:p>
-          <a:p>
-            <a:endParaRPr lang="fr-FR" sz="2400" b="1" dirty="0"/>
+              <a:rPr lang="en-US" dirty="0"/>
+              <a:t>PowerPoint Templates</a:t>
+            </a:r>
           </a:p>
         </p:txBody>
       </p:sp>
@@ -22628,6 +24073,105 @@
 </file>
 
 <file path=ppt/slides/slide15.xml><?xml version="1.0" encoding="utf-8"?>
+<p:sld xmlns:a="http://schemas.openxmlformats.org/drawingml/2006/main" xmlns:r="http://schemas.openxmlformats.org/officeDocument/2006/relationships" xmlns:p="http://schemas.openxmlformats.org/presentationml/2006/main">
+  <p:cSld>
+    <p:spTree>
+      <p:nvGrpSpPr>
+        <p:cNvPr id="1" name=""/>
+        <p:cNvGrpSpPr/>
+        <p:nvPr/>
+      </p:nvGrpSpPr>
+      <p:grpSpPr>
+        <a:xfrm>
+          <a:off x="0" y="0"/>
+          <a:ext cx="0" cy="0"/>
+          <a:chOff x="0" y="0"/>
+          <a:chExt cx="0" cy="0"/>
+        </a:xfrm>
+      </p:grpSpPr>
+      <p:sp>
+        <p:nvSpPr>
+          <p:cNvPr id="2" name="Title 1"/>
+          <p:cNvSpPr>
+            <a:spLocks noGrp="1"/>
+          </p:cNvSpPr>
+          <p:nvPr>
+            <p:ph type="title"/>
+          </p:nvPr>
+        </p:nvSpPr>
+        <p:spPr/>
+        <p:txBody>
+          <a:bodyPr>
+            <a:normAutofit/>
+          </a:bodyPr>
+          <a:lstStyle/>
+          <a:p>
+            <a:r>
+              <a:rPr lang="fr-FR" dirty="0"/>
+              <a:t>PowerPoint Templates – Graphics</a:t>
+            </a:r>
+          </a:p>
+        </p:txBody>
+      </p:sp>
+      <p:sp>
+        <p:nvSpPr>
+          <p:cNvPr id="78" name="Content Placeholder 77"/>
+          <p:cNvSpPr>
+            <a:spLocks noGrp="1"/>
+          </p:cNvSpPr>
+          <p:nvPr>
+            <p:ph type="body" sz="quarter" idx="11"/>
+          </p:nvPr>
+        </p:nvSpPr>
+        <p:spPr>
+          <a:xfrm>
+            <a:off x="325438" y="907126"/>
+            <a:ext cx="8504237" cy="1749197"/>
+          </a:xfrm>
+        </p:spPr>
+        <p:txBody>
+          <a:bodyPr/>
+          <a:lstStyle/>
+          <a:p>
+            <a:r>
+              <a:rPr lang="fr-FR" sz="2400" dirty="0"/>
+              <a:t>This kind of template is identified by a type value as</a:t>
+            </a:r>
+            <a:br>
+              <a:rPr lang="fr-FR" sz="2400" dirty="0"/>
+            </a:br>
+            <a:r>
+              <a:rPr lang="fr-FR" sz="2400" dirty="0"/>
+              <a:t>			</a:t>
+            </a:r>
+          </a:p>
+          <a:p>
+            <a:pPr marL="0" indent="0">
+              <a:buNone/>
+            </a:pPr>
+            <a:r>
+              <a:rPr lang="fr-FR" sz="2400" dirty="0"/>
+              <a:t>			Type = </a:t>
+            </a:r>
+            <a:r>
+              <a:rPr lang="fr-FR" sz="2400" b="1" dirty="0"/>
+              <a:t>GRAPH</a:t>
+            </a:r>
+          </a:p>
+          <a:p>
+            <a:endParaRPr lang="fr-FR" sz="2400" b="1" dirty="0"/>
+          </a:p>
+        </p:txBody>
+      </p:sp>
+    </p:spTree>
+  </p:cSld>
+  <p:clrMapOvr>
+    <a:masterClrMapping/>
+  </p:clrMapOvr>
+</p:sld>
+</file>
+
+<file path=ppt/slides/slide16.xml><?xml version="1.0" encoding="utf-8"?>
 <p:sld xmlns:a="http://schemas.openxmlformats.org/drawingml/2006/main" xmlns:r="http://schemas.openxmlformats.org/officeDocument/2006/relationships" xmlns:p="http://schemas.openxmlformats.org/presentationml/2006/main">
   <p:cSld>
     <p:spTree>
@@ -22759,8 +24303,17 @@
           <a:p>
             <a:r>
               <a:rPr lang="en-US" sz="1800" dirty="0"/>
-              <a:t>Technical Debt Trending Progression</a:t>
-            </a:r>
+              <a:t>Technical Debt Trending Progression - </a:t>
+            </a:r>
+            <a:r>
+              <a:rPr lang="en-US" sz="1800" dirty="0">
+                <a:solidFill>
+                  <a:srgbClr val="FF0000"/>
+                </a:solidFill>
+              </a:rPr>
+              <a:t>deprecated (old Cast formula)</a:t>
+            </a:r>
+            <a:endParaRPr lang="en-US" sz="1800" dirty="0"/>
           </a:p>
         </p:txBody>
       </p:sp>
@@ -23018,13 +24571,7 @@
         <p:nvGraphicFramePr>
           <p:cNvPr id="14" name="Chart 13" descr="GRAPH;PF_TREND_TECH_DEBT"/>
           <p:cNvGraphicFramePr/>
-          <p:nvPr>
-            <p:extLst>
-              <p:ext uri="{D42A27DB-BD31-4B8C-83A1-F6EECF244321}">
-                <p14:modId xmlns:p14="http://schemas.microsoft.com/office/powerpoint/2010/main" val="3190128981"/>
-              </p:ext>
-            </p:extLst>
-          </p:nvPr>
+          <p:nvPr/>
         </p:nvGraphicFramePr>
         <p:xfrm>
           <a:off x="343036" y="2708920"/>
@@ -23037,6 +24584,11 @@
         </a:graphic>
       </p:graphicFrame>
     </p:spTree>
+    <p:extLst>
+      <p:ext uri="{BB962C8B-B14F-4D97-AF65-F5344CB8AC3E}">
+        <p14:creationId xmlns:p14="http://schemas.microsoft.com/office/powerpoint/2010/main" val="2055668813"/>
+      </p:ext>
+    </p:extLst>
   </p:cSld>
   <p:clrMapOvr>
     <a:masterClrMapping/>
@@ -23044,7 +24596,544 @@
 </p:sld>
 </file>
 
-<file path=ppt/slides/slide16.xml><?xml version="1.0" encoding="utf-8"?>
+<file path=ppt/slides/slide17.xml><?xml version="1.0" encoding="utf-8"?>
+<p:sld xmlns:a="http://schemas.openxmlformats.org/drawingml/2006/main" xmlns:r="http://schemas.openxmlformats.org/officeDocument/2006/relationships" xmlns:p="http://schemas.openxmlformats.org/presentationml/2006/main">
+  <p:cSld>
+    <p:spTree>
+      <p:nvGrpSpPr>
+        <p:cNvPr id="1" name=""/>
+        <p:cNvGrpSpPr/>
+        <p:nvPr/>
+      </p:nvGrpSpPr>
+      <p:grpSpPr>
+        <a:xfrm>
+          <a:off x="0" y="0"/>
+          <a:ext cx="0" cy="0"/>
+          <a:chOff x="0" y="0"/>
+          <a:chExt cx="0" cy="0"/>
+        </a:xfrm>
+      </p:grpSpPr>
+      <p:sp>
+        <p:nvSpPr>
+          <p:cNvPr id="24" name="Title 1"/>
+          <p:cNvSpPr>
+            <a:spLocks noGrp="1"/>
+          </p:cNvSpPr>
+          <p:nvPr>
+            <p:ph type="title"/>
+          </p:nvPr>
+        </p:nvSpPr>
+        <p:spPr/>
+        <p:txBody>
+          <a:bodyPr>
+            <a:normAutofit/>
+          </a:bodyPr>
+          <a:lstStyle/>
+          <a:p>
+            <a:r>
+              <a:rPr lang="en-US" dirty="0"/>
+              <a:t>PowerPoint Templates – Graphics</a:t>
+            </a:r>
+          </a:p>
+        </p:txBody>
+      </p:sp>
+      <p:sp>
+        <p:nvSpPr>
+          <p:cNvPr id="33" name="Rounded Rectangle 32"/>
+          <p:cNvSpPr/>
+          <p:nvPr/>
+        </p:nvSpPr>
+        <p:spPr>
+          <a:xfrm>
+            <a:off x="323528" y="692696"/>
+            <a:ext cx="8327272" cy="5112568"/>
+          </a:xfrm>
+          <a:prstGeom prst="roundRect">
+            <a:avLst>
+              <a:gd name="adj" fmla="val 3762"/>
+            </a:avLst>
+          </a:prstGeom>
+          <a:solidFill>
+            <a:schemeClr val="bg1">
+              <a:lumMod val="95000"/>
+            </a:schemeClr>
+          </a:solidFill>
+          <a:ln>
+            <a:noFill/>
+          </a:ln>
+          <a:effectLst/>
+        </p:spPr>
+        <p:style>
+          <a:lnRef idx="1">
+            <a:schemeClr val="accent5"/>
+          </a:lnRef>
+          <a:fillRef idx="3">
+            <a:schemeClr val="accent5"/>
+          </a:fillRef>
+          <a:effectRef idx="2">
+            <a:schemeClr val="accent5"/>
+          </a:effectRef>
+          <a:fontRef idx="minor">
+            <a:schemeClr val="lt1"/>
+          </a:fontRef>
+        </p:style>
+        <p:txBody>
+          <a:bodyPr rtlCol="0" anchor="ctr"/>
+          <a:lstStyle/>
+          <a:p>
+            <a:pPr algn="ctr"/>
+            <a:endParaRPr lang="en-US" dirty="0">
+              <a:solidFill>
+                <a:schemeClr val="lt1"/>
+              </a:solidFill>
+            </a:endParaRPr>
+          </a:p>
+        </p:txBody>
+      </p:sp>
+      <p:sp>
+        <p:nvSpPr>
+          <p:cNvPr id="34" name="TextBox 33"/>
+          <p:cNvSpPr txBox="1"/>
+          <p:nvPr/>
+        </p:nvSpPr>
+        <p:spPr>
+          <a:xfrm>
+            <a:off x="251520" y="692696"/>
+            <a:ext cx="8143200" cy="369332"/>
+          </a:xfrm>
+          <a:prstGeom prst="rect">
+            <a:avLst/>
+          </a:prstGeom>
+          <a:noFill/>
+        </p:spPr>
+        <p:txBody>
+          <a:bodyPr wrap="square" lIns="180000" rIns="180000" rtlCol="0">
+            <a:spAutoFit/>
+          </a:bodyPr>
+          <a:lstStyle>
+            <a:defPPr>
+              <a:defRPr lang="fr-FR"/>
+            </a:defPPr>
+            <a:lvl1pPr>
+              <a:defRPr sz="2000" b="1">
+                <a:solidFill>
+                  <a:schemeClr val="tx1">
+                    <a:lumMod val="75000"/>
+                    <a:lumOff val="25000"/>
+                  </a:schemeClr>
+                </a:solidFill>
+              </a:defRPr>
+            </a:lvl1pPr>
+          </a:lstStyle>
+          <a:p>
+            <a:r>
+              <a:rPr lang="en-US" sz="1800" dirty="0"/>
+              <a:t>OMG Technical Debt Trending Progression</a:t>
+            </a:r>
+          </a:p>
+        </p:txBody>
+      </p:sp>
+      <p:sp>
+        <p:nvSpPr>
+          <p:cNvPr id="36" name="TextBox 35"/>
+          <p:cNvSpPr txBox="1"/>
+          <p:nvPr/>
+        </p:nvSpPr>
+        <p:spPr>
+          <a:xfrm>
+            <a:off x="1907704" y="1452846"/>
+            <a:ext cx="6630534" cy="369332"/>
+          </a:xfrm>
+          <a:prstGeom prst="rect">
+            <a:avLst/>
+          </a:prstGeom>
+          <a:noFill/>
+        </p:spPr>
+        <p:txBody>
+          <a:bodyPr wrap="square" rtlCol="0">
+            <a:spAutoFit/>
+          </a:bodyPr>
+          <a:lstStyle>
+            <a:defPPr>
+              <a:defRPr lang="fr-FR"/>
+            </a:defPPr>
+            <a:lvl1pPr>
+              <a:defRPr sz="2000" b="1">
+                <a:solidFill>
+                  <a:srgbClr val="5E5E5E"/>
+                </a:solidFill>
+              </a:defRPr>
+            </a:lvl1pPr>
+          </a:lstStyle>
+          <a:p>
+            <a:r>
+              <a:rPr lang="en-US" sz="1800" dirty="0"/>
+              <a:t>PF_TREND_OMG_TECH_DEBT</a:t>
+            </a:r>
+          </a:p>
+        </p:txBody>
+      </p:sp>
+      <p:sp>
+        <p:nvSpPr>
+          <p:cNvPr id="37" name="TextBox 36"/>
+          <p:cNvSpPr txBox="1"/>
+          <p:nvPr/>
+        </p:nvSpPr>
+        <p:spPr>
+          <a:xfrm>
+            <a:off x="395536" y="1412776"/>
+            <a:ext cx="1556836" cy="369332"/>
+          </a:xfrm>
+          <a:prstGeom prst="rect">
+            <a:avLst/>
+          </a:prstGeom>
+          <a:noFill/>
+        </p:spPr>
+        <p:txBody>
+          <a:bodyPr wrap="none" rtlCol="0">
+            <a:spAutoFit/>
+          </a:bodyPr>
+          <a:lstStyle>
+            <a:defPPr>
+              <a:defRPr lang="fr-FR"/>
+            </a:defPPr>
+            <a:lvl1pPr algn="r">
+              <a:defRPr sz="2000">
+                <a:solidFill>
+                  <a:schemeClr val="bg1">
+                    <a:lumMod val="50000"/>
+                  </a:schemeClr>
+                </a:solidFill>
+              </a:defRPr>
+            </a:lvl1pPr>
+          </a:lstStyle>
+          <a:p>
+            <a:r>
+              <a:rPr lang="en-US" sz="1800" dirty="0"/>
+              <a:t>Block Name :</a:t>
+            </a:r>
+          </a:p>
+        </p:txBody>
+      </p:sp>
+      <p:sp>
+        <p:nvSpPr>
+          <p:cNvPr id="38" name="TextBox 37"/>
+          <p:cNvSpPr txBox="1"/>
+          <p:nvPr/>
+        </p:nvSpPr>
+        <p:spPr>
+          <a:xfrm>
+            <a:off x="1907704" y="1763524"/>
+            <a:ext cx="6743096" cy="338554"/>
+          </a:xfrm>
+          <a:prstGeom prst="rect">
+            <a:avLst/>
+          </a:prstGeom>
+          <a:noFill/>
+        </p:spPr>
+        <p:txBody>
+          <a:bodyPr wrap="square" rtlCol="0">
+            <a:spAutoFit/>
+          </a:bodyPr>
+          <a:lstStyle>
+            <a:defPPr>
+              <a:defRPr lang="fr-FR"/>
+            </a:defPPr>
+            <a:lvl1pPr>
+              <a:defRPr sz="2000" i="1">
+                <a:solidFill>
+                  <a:schemeClr val="bg1">
+                    <a:lumMod val="50000"/>
+                  </a:schemeClr>
+                </a:solidFill>
+              </a:defRPr>
+            </a:lvl1pPr>
+          </a:lstStyle>
+          <a:p>
+            <a:r>
+              <a:rPr lang="en-US" sz="1600" dirty="0"/>
+              <a:t>ID=ISO or AIP or CISQ (ISO by default if not present)</a:t>
+            </a:r>
+          </a:p>
+        </p:txBody>
+      </p:sp>
+      <p:sp>
+        <p:nvSpPr>
+          <p:cNvPr id="39" name="TextBox 38"/>
+          <p:cNvSpPr txBox="1"/>
+          <p:nvPr/>
+        </p:nvSpPr>
+        <p:spPr>
+          <a:xfrm>
+            <a:off x="827584" y="1763524"/>
+            <a:ext cx="1107996" cy="369332"/>
+          </a:xfrm>
+          <a:prstGeom prst="rect">
+            <a:avLst/>
+          </a:prstGeom>
+          <a:noFill/>
+        </p:spPr>
+        <p:txBody>
+          <a:bodyPr wrap="none" rtlCol="0">
+            <a:spAutoFit/>
+          </a:bodyPr>
+          <a:lstStyle>
+            <a:defPPr>
+              <a:defRPr lang="fr-FR"/>
+            </a:defPPr>
+            <a:lvl1pPr algn="r">
+              <a:defRPr sz="2000">
+                <a:solidFill>
+                  <a:schemeClr val="bg1">
+                    <a:lumMod val="50000"/>
+                  </a:schemeClr>
+                </a:solidFill>
+              </a:defRPr>
+            </a:lvl1pPr>
+          </a:lstStyle>
+          <a:p>
+            <a:r>
+              <a:rPr lang="en-US" sz="1800" dirty="0"/>
+              <a:t>Options :</a:t>
+            </a:r>
+          </a:p>
+        </p:txBody>
+      </p:sp>
+      <p:sp>
+        <p:nvSpPr>
+          <p:cNvPr id="12" name="TextBox 11"/>
+          <p:cNvSpPr txBox="1"/>
+          <p:nvPr/>
+        </p:nvSpPr>
+        <p:spPr>
+          <a:xfrm>
+            <a:off x="1938768" y="2123564"/>
+            <a:ext cx="6455952" cy="338554"/>
+          </a:xfrm>
+          <a:prstGeom prst="rect">
+            <a:avLst/>
+          </a:prstGeom>
+          <a:noFill/>
+        </p:spPr>
+        <p:txBody>
+          <a:bodyPr wrap="square" rtlCol="0">
+            <a:spAutoFit/>
+          </a:bodyPr>
+          <a:lstStyle>
+            <a:defPPr>
+              <a:defRPr lang="fr-FR"/>
+            </a:defPPr>
+            <a:lvl1pPr>
+              <a:defRPr i="1">
+                <a:solidFill>
+                  <a:schemeClr val="bg1">
+                    <a:lumMod val="50000"/>
+                  </a:schemeClr>
+                </a:solidFill>
+              </a:defRPr>
+            </a:lvl1pPr>
+          </a:lstStyle>
+          <a:p>
+            <a:r>
+              <a:rPr lang="en-US" sz="1600" dirty="0"/>
+              <a:t>X axis is based on the last 6 previous quarter starting from today</a:t>
+            </a:r>
+          </a:p>
+        </p:txBody>
+      </p:sp>
+      <p:sp>
+        <p:nvSpPr>
+          <p:cNvPr id="13" name="TextBox 12"/>
+          <p:cNvSpPr txBox="1"/>
+          <p:nvPr/>
+        </p:nvSpPr>
+        <p:spPr>
+          <a:xfrm>
+            <a:off x="1166425" y="2123564"/>
+            <a:ext cx="800219" cy="369332"/>
+          </a:xfrm>
+          <a:prstGeom prst="rect">
+            <a:avLst/>
+          </a:prstGeom>
+          <a:noFill/>
+        </p:spPr>
+        <p:txBody>
+          <a:bodyPr wrap="none" rtlCol="0">
+            <a:spAutoFit/>
+          </a:bodyPr>
+          <a:lstStyle>
+            <a:defPPr>
+              <a:defRPr lang="fr-FR"/>
+            </a:defPPr>
+            <a:lvl1pPr algn="r">
+              <a:defRPr sz="2000">
+                <a:solidFill>
+                  <a:schemeClr val="bg1">
+                    <a:lumMod val="50000"/>
+                  </a:schemeClr>
+                </a:solidFill>
+              </a:defRPr>
+            </a:lvl1pPr>
+          </a:lstStyle>
+          <a:p>
+            <a:r>
+              <a:rPr lang="en-US" sz="1800" dirty="0"/>
+              <a:t>Note :</a:t>
+            </a:r>
+          </a:p>
+        </p:txBody>
+      </p:sp>
+      <p:graphicFrame>
+        <p:nvGraphicFramePr>
+          <p:cNvPr id="14" name="Chart 13" descr="GRAPH;PF_TREND_OMG_TECH_DEBT"/>
+          <p:cNvGraphicFramePr/>
+          <p:nvPr>
+            <p:extLst>
+              <p:ext uri="{D42A27DB-BD31-4B8C-83A1-F6EECF244321}">
+                <p14:modId xmlns:p14="http://schemas.microsoft.com/office/powerpoint/2010/main" val="1196578329"/>
+              </p:ext>
+            </p:extLst>
+          </p:nvPr>
+        </p:nvGraphicFramePr>
+        <p:xfrm>
+          <a:off x="343036" y="2348880"/>
+          <a:ext cx="8500411" cy="3886186"/>
+        </p:xfrm>
+        <a:graphic>
+          <a:graphicData uri="http://schemas.openxmlformats.org/drawingml/2006/chart">
+            <c:chart xmlns:c="http://schemas.openxmlformats.org/drawingml/2006/chart" xmlns:r="http://schemas.openxmlformats.org/officeDocument/2006/relationships" r:id="rId2"/>
+          </a:graphicData>
+        </a:graphic>
+      </p:graphicFrame>
+      <p:sp>
+        <p:nvSpPr>
+          <p:cNvPr id="22" name="TextBox 21">
+            <a:extLst>
+              <a:ext uri="{FF2B5EF4-FFF2-40B4-BE49-F238E27FC236}">
+                <a16:creationId xmlns:a16="http://schemas.microsoft.com/office/drawing/2014/main" id="{8C842FA8-8114-4698-B081-0E84D4D8968E}"/>
+              </a:ext>
+            </a:extLst>
+          </p:cNvPr>
+          <p:cNvSpPr txBox="1"/>
+          <p:nvPr/>
+        </p:nvSpPr>
+        <p:spPr>
+          <a:xfrm>
+            <a:off x="419390" y="1074222"/>
+            <a:ext cx="6743096" cy="338554"/>
+          </a:xfrm>
+          <a:prstGeom prst="rect">
+            <a:avLst/>
+          </a:prstGeom>
+          <a:noFill/>
+        </p:spPr>
+        <p:txBody>
+          <a:bodyPr wrap="square" rtlCol="0">
+            <a:spAutoFit/>
+          </a:bodyPr>
+          <a:lstStyle>
+            <a:defPPr>
+              <a:defRPr lang="fr-FR"/>
+            </a:defPPr>
+            <a:lvl1pPr>
+              <a:defRPr sz="2000" i="1">
+                <a:solidFill>
+                  <a:schemeClr val="bg1">
+                    <a:lumMod val="50000"/>
+                  </a:schemeClr>
+                </a:solidFill>
+              </a:defRPr>
+            </a:lvl1pPr>
+          </a:lstStyle>
+          <a:p>
+            <a:r>
+              <a:rPr lang="en-US" sz="1600" dirty="0"/>
+              <a:t>Display the trend of OMG Technical Debt in Days</a:t>
+            </a:r>
+          </a:p>
+        </p:txBody>
+      </p:sp>
+      <p:sp>
+        <p:nvSpPr>
+          <p:cNvPr id="23" name="TextBox 22">
+            <a:extLst>
+              <a:ext uri="{FF2B5EF4-FFF2-40B4-BE49-F238E27FC236}">
+                <a16:creationId xmlns:a16="http://schemas.microsoft.com/office/drawing/2014/main" id="{35637534-3DF3-4ED4-AB10-565DF3E1F313}"/>
+              </a:ext>
+            </a:extLst>
+          </p:cNvPr>
+          <p:cNvSpPr txBox="1"/>
+          <p:nvPr/>
+        </p:nvSpPr>
+        <p:spPr>
+          <a:xfrm>
+            <a:off x="139131" y="5766666"/>
+            <a:ext cx="8661833" cy="798748"/>
+          </a:xfrm>
+          <a:prstGeom prst="rect">
+            <a:avLst/>
+          </a:prstGeom>
+        </p:spPr>
+        <p:txBody>
+          <a:bodyPr vert="horz" wrap="square" lIns="91440" tIns="45720" rIns="91440" bIns="45720" rtlCol="0" anchor="t">
+            <a:noAutofit/>
+          </a:bodyPr>
+          <a:lstStyle/>
+          <a:p>
+            <a:pPr marL="285750" indent="-285750">
+              <a:buFont typeface="Arial" panose="020B0604020202020204" pitchFamily="34" charset="0"/>
+              <a:buChar char="•"/>
+            </a:pPr>
+            <a:r>
+              <a:rPr lang="en-US" sz="1100" dirty="0">
+                <a:solidFill>
+                  <a:srgbClr val="0070C0"/>
+                </a:solidFill>
+              </a:rPr>
+              <a:t>ISO option is the recommended technical debt to be used. Requires installation of OMG Technical Debt Measure (&gt;2.0.0 </a:t>
+            </a:r>
+            <a:r>
+              <a:rPr lang="en-US" sz="1100" dirty="0" err="1">
+                <a:solidFill>
+                  <a:srgbClr val="0070C0"/>
+                </a:solidFill>
+              </a:rPr>
+              <a:t>funcrel</a:t>
+            </a:r>
+            <a:r>
+              <a:rPr lang="en-US" sz="1100" dirty="0">
+                <a:solidFill>
+                  <a:srgbClr val="0070C0"/>
+                </a:solidFill>
+              </a:rPr>
+              <a:t>) and ISO-5055 Index extensions during analysis</a:t>
+            </a:r>
+          </a:p>
+          <a:p>
+            <a:pPr marL="285750" indent="-285750">
+              <a:buFont typeface="Arial" panose="020B0604020202020204" pitchFamily="34" charset="0"/>
+              <a:buChar char="•"/>
+            </a:pPr>
+            <a:r>
+              <a:rPr lang="en-US" sz="1100" dirty="0">
+                <a:solidFill>
+                  <a:srgbClr val="0070C0"/>
+                </a:solidFill>
+              </a:rPr>
+              <a:t>CISQ option required installation of OMG Technical Debt Measure and CISQ Index extensions during analysis. Scope of rules is reduced</a:t>
+            </a:r>
+          </a:p>
+        </p:txBody>
+      </p:sp>
+    </p:spTree>
+  </p:cSld>
+  <p:clrMapOvr>
+    <a:masterClrMapping/>
+  </p:clrMapOvr>
+</p:sld>
+</file>
+
+<file path=ppt/slides/slide18.xml><?xml version="1.0" encoding="utf-8"?>
 <p:sld xmlns:a="http://schemas.openxmlformats.org/drawingml/2006/main" xmlns:r="http://schemas.openxmlformats.org/officeDocument/2006/relationships" xmlns:p="http://schemas.openxmlformats.org/presentationml/2006/main">
   <p:cSld>
     <p:spTree>
@@ -23470,7 +25559,7 @@
 </p:sld>
 </file>
 
-<file path=ppt/slides/slide17.xml><?xml version="1.0" encoding="utf-8"?>
+<file path=ppt/slides/slide19.xml><?xml version="1.0" encoding="utf-8"?>
 <p:sld xmlns:a="http://schemas.openxmlformats.org/drawingml/2006/main" xmlns:r="http://schemas.openxmlformats.org/officeDocument/2006/relationships" xmlns:p="http://schemas.openxmlformats.org/presentationml/2006/main">
   <p:cSld>
     <p:spTree>
@@ -23883,7 +25972,88 @@
 </p:sld>
 </file>
 
-<file path=ppt/slides/slide18.xml><?xml version="1.0" encoding="utf-8"?>
+<file path=ppt/slides/slide2.xml><?xml version="1.0" encoding="utf-8"?>
+<p:sld xmlns:a="http://schemas.openxmlformats.org/drawingml/2006/main" xmlns:r="http://schemas.openxmlformats.org/officeDocument/2006/relationships" xmlns:p="http://schemas.openxmlformats.org/presentationml/2006/main">
+  <p:cSld>
+    <p:spTree>
+      <p:nvGrpSpPr>
+        <p:cNvPr id="1" name=""/>
+        <p:cNvGrpSpPr/>
+        <p:nvPr/>
+      </p:nvGrpSpPr>
+      <p:grpSpPr>
+        <a:xfrm>
+          <a:off x="0" y="0"/>
+          <a:ext cx="0" cy="0"/>
+          <a:chOff x="0" y="0"/>
+          <a:chExt cx="0" cy="0"/>
+        </a:xfrm>
+      </p:grpSpPr>
+      <p:sp>
+        <p:nvSpPr>
+          <p:cNvPr id="2" name="Title 1"/>
+          <p:cNvSpPr>
+            <a:spLocks noGrp="1"/>
+          </p:cNvSpPr>
+          <p:nvPr>
+            <p:ph type="title"/>
+          </p:nvPr>
+        </p:nvSpPr>
+        <p:spPr/>
+        <p:txBody>
+          <a:bodyPr/>
+          <a:lstStyle/>
+          <a:p>
+            <a:r>
+              <a:rPr lang="fr-FR" dirty="0"/>
+              <a:t>Powerpoint Templates</a:t>
+            </a:r>
+          </a:p>
+        </p:txBody>
+      </p:sp>
+      <p:sp>
+        <p:nvSpPr>
+          <p:cNvPr id="3" name="Content Placeholder 2"/>
+          <p:cNvSpPr>
+            <a:spLocks noGrp="1"/>
+          </p:cNvSpPr>
+          <p:nvPr>
+            <p:ph type="body" sz="quarter" idx="11"/>
+          </p:nvPr>
+        </p:nvSpPr>
+        <p:spPr/>
+        <p:txBody>
+          <a:bodyPr/>
+          <a:lstStyle/>
+          <a:p>
+            <a:pPr algn="just"/>
+            <a:r>
+              <a:rPr lang="fr-FR" dirty="0"/>
+              <a:t>When Word uses placeholder to target a customizable component, PowerPoint uses alternative text property of TextBox, Table or ChartArea</a:t>
+            </a:r>
+          </a:p>
+          <a:p>
+            <a:pPr algn="just"/>
+            <a:endParaRPr lang="fr-FR" dirty="0"/>
+          </a:p>
+          <a:p>
+            <a:pPr algn="just"/>
+            <a:r>
+              <a:rPr lang="fr-FR" dirty="0"/>
+              <a:t>To see alternative text property of all component, you should activate « Size and Position »  button in Powerpoint properties</a:t>
+            </a:r>
+          </a:p>
+        </p:txBody>
+      </p:sp>
+    </p:spTree>
+  </p:cSld>
+  <p:clrMapOvr>
+    <a:masterClrMapping/>
+  </p:clrMapOvr>
+</p:sld>
+</file>
+
+<file path=ppt/slides/slide20.xml><?xml version="1.0" encoding="utf-8"?>
 <p:sld xmlns:a="http://schemas.openxmlformats.org/drawingml/2006/main" xmlns:r="http://schemas.openxmlformats.org/officeDocument/2006/relationships" xmlns:p="http://schemas.openxmlformats.org/presentationml/2006/main">
   <p:cSld>
     <p:spTree>
@@ -24225,7 +26395,7 @@
 </p:sld>
 </file>
 
-<file path=ppt/slides/slide19.xml><?xml version="1.0" encoding="utf-8"?>
+<file path=ppt/slides/slide21.xml><?xml version="1.0" encoding="utf-8"?>
 <p:sld xmlns:a="http://schemas.openxmlformats.org/drawingml/2006/main" xmlns:r="http://schemas.openxmlformats.org/officeDocument/2006/relationships" xmlns:p="http://schemas.openxmlformats.org/presentationml/2006/main">
   <p:cSld>
     <p:spTree>
@@ -24294,7 +26464,7 @@
 </p:sld>
 </file>
 
-<file path=ppt/slides/slide2.xml><?xml version="1.0" encoding="utf-8"?>
+<file path=ppt/slides/slide22.xml><?xml version="1.0" encoding="utf-8"?>
 <p:sld xmlns:a="http://schemas.openxmlformats.org/drawingml/2006/main" xmlns:r="http://schemas.openxmlformats.org/officeDocument/2006/relationships" xmlns:p="http://schemas.openxmlformats.org/presentationml/2006/main">
   <p:cSld>
     <p:spTree>
@@ -24323,19 +26493,21 @@
         </p:nvSpPr>
         <p:spPr/>
         <p:txBody>
-          <a:bodyPr/>
+          <a:bodyPr>
+            <a:normAutofit/>
+          </a:bodyPr>
           <a:lstStyle/>
           <a:p>
             <a:r>
               <a:rPr lang="fr-FR" dirty="0"/>
-              <a:t>Powerpoint Templates</a:t>
-            </a:r>
-          </a:p>
-        </p:txBody>
-      </p:sp>
-      <p:sp>
-        <p:nvSpPr>
-          <p:cNvPr id="3" name="Content Placeholder 2"/>
+              <a:t>PowerPoint Templates – Tables</a:t>
+            </a:r>
+          </a:p>
+        </p:txBody>
+      </p:sp>
+      <p:sp>
+        <p:nvSpPr>
+          <p:cNvPr id="78" name="Content Placeholder 77"/>
           <p:cNvSpPr>
             <a:spLocks noGrp="1"/>
           </p:cNvSpPr>
@@ -24343,27 +26515,52 @@
             <p:ph type="body" sz="quarter" idx="11"/>
           </p:nvPr>
         </p:nvSpPr>
-        <p:spPr/>
+        <p:spPr>
+          <a:xfrm>
+            <a:off x="325438" y="907126"/>
+            <a:ext cx="8504237" cy="2208297"/>
+          </a:xfrm>
+        </p:spPr>
         <p:txBody>
           <a:bodyPr/>
           <a:lstStyle/>
           <a:p>
-            <a:pPr algn="just"/>
-            <a:r>
-              <a:rPr lang="fr-FR" dirty="0"/>
-              <a:t>When Word uses placeholder to target a customizable component, PowerPoint uses alternative text property of TextBox, Table or ChartArea</a:t>
-            </a:r>
-          </a:p>
-          <a:p>
-            <a:pPr algn="just"/>
-            <a:endParaRPr lang="fr-FR" dirty="0"/>
-          </a:p>
-          <a:p>
-            <a:pPr algn="just"/>
-            <a:r>
-              <a:rPr lang="fr-FR" dirty="0"/>
-              <a:t>To see alternative text property of all component, you should activate « Size and Position »  button in Powerpoint properties</a:t>
-            </a:r>
+            <a:r>
+              <a:rPr lang="fr-FR" sz="2400" dirty="0"/>
+              <a:t>This kind of template is identified by a type value as</a:t>
+            </a:r>
+            <a:br>
+              <a:rPr lang="fr-FR" sz="2400" dirty="0"/>
+            </a:br>
+            <a:r>
+              <a:rPr lang="fr-FR" sz="2400" dirty="0"/>
+              <a:t>			</a:t>
+            </a:r>
+          </a:p>
+          <a:p>
+            <a:pPr marL="0" indent="0">
+              <a:buNone/>
+            </a:pPr>
+            <a:r>
+              <a:rPr lang="fr-FR" sz="2400" dirty="0"/>
+              <a:t>			Type = </a:t>
+            </a:r>
+            <a:r>
+              <a:rPr lang="fr-FR" sz="2400" b="1" dirty="0"/>
+              <a:t>TABLE</a:t>
+            </a:r>
+          </a:p>
+          <a:p>
+            <a:pPr marL="0" indent="0">
+              <a:buNone/>
+            </a:pPr>
+            <a:endParaRPr lang="fr-FR" sz="2400" b="1" dirty="0"/>
+          </a:p>
+          <a:p>
+            <a:pPr marL="0" indent="0">
+              <a:buNone/>
+            </a:pPr>
+            <a:endParaRPr lang="fr-FR" sz="2400" b="1" dirty="0"/>
           </a:p>
         </p:txBody>
       </p:sp>
@@ -24375,115 +26572,7 @@
 </p:sld>
 </file>
 
-<file path=ppt/slides/slide20.xml><?xml version="1.0" encoding="utf-8"?>
-<p:sld xmlns:a="http://schemas.openxmlformats.org/drawingml/2006/main" xmlns:r="http://schemas.openxmlformats.org/officeDocument/2006/relationships" xmlns:p="http://schemas.openxmlformats.org/presentationml/2006/main">
-  <p:cSld>
-    <p:spTree>
-      <p:nvGrpSpPr>
-        <p:cNvPr id="1" name=""/>
-        <p:cNvGrpSpPr/>
-        <p:nvPr/>
-      </p:nvGrpSpPr>
-      <p:grpSpPr>
-        <a:xfrm>
-          <a:off x="0" y="0"/>
-          <a:ext cx="0" cy="0"/>
-          <a:chOff x="0" y="0"/>
-          <a:chExt cx="0" cy="0"/>
-        </a:xfrm>
-      </p:grpSpPr>
-      <p:sp>
-        <p:nvSpPr>
-          <p:cNvPr id="2" name="Title 1"/>
-          <p:cNvSpPr>
-            <a:spLocks noGrp="1"/>
-          </p:cNvSpPr>
-          <p:nvPr>
-            <p:ph type="title"/>
-          </p:nvPr>
-        </p:nvSpPr>
-        <p:spPr/>
-        <p:txBody>
-          <a:bodyPr>
-            <a:normAutofit/>
-          </a:bodyPr>
-          <a:lstStyle/>
-          <a:p>
-            <a:r>
-              <a:rPr lang="fr-FR" dirty="0"/>
-              <a:t>PowerPoint Templates – Tables</a:t>
-            </a:r>
-          </a:p>
-        </p:txBody>
-      </p:sp>
-      <p:sp>
-        <p:nvSpPr>
-          <p:cNvPr id="78" name="Content Placeholder 77"/>
-          <p:cNvSpPr>
-            <a:spLocks noGrp="1"/>
-          </p:cNvSpPr>
-          <p:nvPr>
-            <p:ph type="body" sz="quarter" idx="11"/>
-          </p:nvPr>
-        </p:nvSpPr>
-        <p:spPr>
-          <a:xfrm>
-            <a:off x="325438" y="907126"/>
-            <a:ext cx="8504237" cy="2208297"/>
-          </a:xfrm>
-        </p:spPr>
-        <p:txBody>
-          <a:bodyPr/>
-          <a:lstStyle/>
-          <a:p>
-            <a:r>
-              <a:rPr lang="fr-FR" sz="2400" dirty="0"/>
-              <a:t>This kind of template is identified by a type value as</a:t>
-            </a:r>
-            <a:br>
-              <a:rPr lang="fr-FR" sz="2400" dirty="0"/>
-            </a:br>
-            <a:r>
-              <a:rPr lang="fr-FR" sz="2400" dirty="0"/>
-              <a:t>			</a:t>
-            </a:r>
-          </a:p>
-          <a:p>
-            <a:pPr marL="0" indent="0">
-              <a:buNone/>
-            </a:pPr>
-            <a:r>
-              <a:rPr lang="fr-FR" sz="2400" dirty="0"/>
-              <a:t>			Type = </a:t>
-            </a:r>
-            <a:r>
-              <a:rPr lang="fr-FR" sz="2400" b="1" dirty="0"/>
-              <a:t>TABLE</a:t>
-            </a:r>
-          </a:p>
-          <a:p>
-            <a:pPr marL="0" indent="0">
-              <a:buNone/>
-            </a:pPr>
-            <a:endParaRPr lang="fr-FR" sz="2400" b="1" dirty="0"/>
-          </a:p>
-          <a:p>
-            <a:pPr marL="0" indent="0">
-              <a:buNone/>
-            </a:pPr>
-            <a:endParaRPr lang="fr-FR" sz="2400" b="1" dirty="0"/>
-          </a:p>
-        </p:txBody>
-      </p:sp>
-    </p:spTree>
-  </p:cSld>
-  <p:clrMapOvr>
-    <a:masterClrMapping/>
-  </p:clrMapOvr>
-</p:sld>
-</file>
-
-<file path=ppt/slides/slide21.xml><?xml version="1.0" encoding="utf-8"?>
+<file path=ppt/slides/slide23.xml><?xml version="1.0" encoding="utf-8"?>
 <p:sld xmlns:a="http://schemas.openxmlformats.org/drawingml/2006/main" xmlns:r="http://schemas.openxmlformats.org/officeDocument/2006/relationships" xmlns:p="http://schemas.openxmlformats.org/presentationml/2006/main">
   <p:cSld>
     <p:spTree>
@@ -26318,7 +28407,7 @@
 </p:sld>
 </file>
 
-<file path=ppt/slides/slide22.xml><?xml version="1.0" encoding="utf-8"?>
+<file path=ppt/slides/slide24.xml><?xml version="1.0" encoding="utf-8"?>
 <p:sld xmlns:a="http://schemas.openxmlformats.org/drawingml/2006/main" xmlns:r="http://schemas.openxmlformats.org/officeDocument/2006/relationships" xmlns:p="http://schemas.openxmlformats.org/presentationml/2006/main">
   <p:cSld>
     <p:spTree>
@@ -28498,7 +30587,7 @@
 </p:sld>
 </file>
 
-<file path=ppt/slides/slide23.xml><?xml version="1.0" encoding="utf-8"?>
+<file path=ppt/slides/slide25.xml><?xml version="1.0" encoding="utf-8"?>
 <p:sld xmlns:a="http://schemas.openxmlformats.org/drawingml/2006/main" xmlns:r="http://schemas.openxmlformats.org/officeDocument/2006/relationships" xmlns:p="http://schemas.openxmlformats.org/presentationml/2006/main">
   <p:cSld>
     <p:spTree>
@@ -28549,7 +30638,7 @@
                   <a:prstClr val="black"/>
                 </a:buClr>
               </a:pPr>
-              <a:t>23</a:t>
+              <a:t>25</a:t>
             </a:fld>
             <a:endParaRPr lang="en-US" dirty="0">
               <a:solidFill>
@@ -28746,7 +30835,7 @@
 </p:sld>
 </file>
 
-<file path=ppt/slides/slide24.xml><?xml version="1.0" encoding="utf-8"?>
+<file path=ppt/slides/slide26.xml><?xml version="1.0" encoding="utf-8"?>
 <p:sld xmlns:a="http://schemas.openxmlformats.org/drawingml/2006/main" xmlns:r="http://schemas.openxmlformats.org/officeDocument/2006/relationships" xmlns:p="http://schemas.openxmlformats.org/presentationml/2006/main">
   <p:cSld>
     <p:spTree>
@@ -30301,7 +32390,7 @@
 </p:sld>
 </file>
 
-<file path=ppt/slides/slide25.xml><?xml version="1.0" encoding="utf-8"?>
+<file path=ppt/slides/slide27.xml><?xml version="1.0" encoding="utf-8"?>
 <p:sld xmlns:a="http://schemas.openxmlformats.org/drawingml/2006/main" xmlns:r="http://schemas.openxmlformats.org/officeDocument/2006/relationships" xmlns:p="http://schemas.openxmlformats.org/presentationml/2006/main">
   <p:cSld>
     <p:spTree>
@@ -31479,7 +33568,7 @@
 </p:sld>
 </file>
 
-<file path=ppt/slides/slide26.xml><?xml version="1.0" encoding="utf-8"?>
+<file path=ppt/slides/slide28.xml><?xml version="1.0" encoding="utf-8"?>
 <p:sld xmlns:a="http://schemas.openxmlformats.org/drawingml/2006/main" xmlns:r="http://schemas.openxmlformats.org/officeDocument/2006/relationships" xmlns:p="http://schemas.openxmlformats.org/presentationml/2006/main">
   <p:cSld>
     <p:spTree>
@@ -31530,7 +33619,7 @@
                   <a:prstClr val="black"/>
                 </a:buClr>
               </a:pPr>
-              <a:t>26</a:t>
+              <a:t>28</a:t>
             </a:fld>
             <a:endParaRPr lang="en-US" dirty="0">
               <a:solidFill>

</xml_diff>